<commit_message>
build: fixed exit from profile problem, when you exit and login again the window is closing
</commit_message>
<xml_diff>
--- a/resources/PortSave.pptx
+++ b/resources/PortSave.pptx
@@ -16,7 +16,7 @@
     <p:sldId id="263" r:id="rId11"/>
   </p:sldIdLst>
   <p:sldSz cx="9144000" cy="6858000"/>
-  <p:notesSz cx="6858000" cy="9144000"/>
+  <p:notesSz cx="7559675" cy="10691812"/>
 </p:presentation>
 </file>
 
@@ -61,7 +61,7 @@
       </p:grpSpPr>
       <p:sp>
         <p:nvSpPr>
-          <p:cNvPr id="26" name="PlaceHolder 1"/>
+          <p:cNvPr id="23" name="PlaceHolder 1"/>
           <p:cNvSpPr>
             <a:spLocks noGrp="1"/>
           </p:cNvSpPr>
@@ -71,8 +71,8 @@
         </p:nvSpPr>
         <p:spPr>
           <a:xfrm>
-            <a:off x="457200" y="274680"/>
-            <a:ext cx="8229240" cy="1142640"/>
+            <a:off x="457200" y="273600"/>
+            <a:ext cx="8229240" cy="1144800"/>
           </a:xfrm>
           <a:prstGeom prst="rect">
             <a:avLst/>
@@ -83,18 +83,16 @@
             <a:noAutofit/>
           </a:bodyPr>
           <a:p>
-            <a:endParaRPr b="0" lang="ru-RU" sz="4400" spc="-1" strike="noStrike">
-              <a:solidFill>
-                <a:srgbClr val="000000"/>
-              </a:solidFill>
-              <a:latin typeface="Arial"/>
-            </a:endParaRPr>
-          </a:p>
-        </p:txBody>
-      </p:sp>
-      <p:sp>
-        <p:nvSpPr>
-          <p:cNvPr id="27" name="PlaceHolder 2"/>
+            <a:pPr algn="ctr"/>
+            <a:endParaRPr b="0" lang="en-GB" sz="4400" spc="-1" strike="noStrike">
+              <a:latin typeface="Arial"/>
+            </a:endParaRPr>
+          </a:p>
+        </p:txBody>
+      </p:sp>
+      <p:sp>
+        <p:nvSpPr>
+          <p:cNvPr id="24" name="PlaceHolder 2"/>
           <p:cNvSpPr>
             <a:spLocks noGrp="1"/>
           </p:cNvSpPr>
@@ -104,8 +102,8 @@
         </p:nvSpPr>
         <p:spPr>
           <a:xfrm>
-            <a:off x="457200" y="1600200"/>
-            <a:ext cx="8229240" cy="2158560"/>
+            <a:off x="457200" y="1604520"/>
+            <a:ext cx="8229240" cy="1896840"/>
           </a:xfrm>
           <a:prstGeom prst="rect">
             <a:avLst/>
@@ -116,18 +114,15 @@
             <a:normAutofit/>
           </a:bodyPr>
           <a:p>
-            <a:endParaRPr b="0" lang="ru-RU" sz="3200" spc="-1" strike="noStrike">
-              <a:solidFill>
-                <a:srgbClr val="000000"/>
-              </a:solidFill>
-              <a:latin typeface="Calibri"/>
-            </a:endParaRPr>
-          </a:p>
-        </p:txBody>
-      </p:sp>
-      <p:sp>
-        <p:nvSpPr>
-          <p:cNvPr id="28" name="PlaceHolder 3"/>
+            <a:endParaRPr b="0" lang="en-GB" sz="3200" spc="-1" strike="noStrike">
+              <a:latin typeface="Arial"/>
+            </a:endParaRPr>
+          </a:p>
+        </p:txBody>
+      </p:sp>
+      <p:sp>
+        <p:nvSpPr>
+          <p:cNvPr id="25" name="PlaceHolder 3"/>
           <p:cNvSpPr>
             <a:spLocks noGrp="1"/>
           </p:cNvSpPr>
@@ -137,8 +132,8 @@
         </p:nvSpPr>
         <p:spPr>
           <a:xfrm>
-            <a:off x="457200" y="3964320"/>
-            <a:ext cx="8229240" cy="2158560"/>
+            <a:off x="457200" y="3682080"/>
+            <a:ext cx="8229240" cy="1896840"/>
           </a:xfrm>
           <a:prstGeom prst="rect">
             <a:avLst/>
@@ -149,11 +144,8 @@
             <a:normAutofit/>
           </a:bodyPr>
           <a:p>
-            <a:endParaRPr b="0" lang="ru-RU" sz="3200" spc="-1" strike="noStrike">
-              <a:solidFill>
-                <a:srgbClr val="000000"/>
-              </a:solidFill>
-              <a:latin typeface="Calibri"/>
+            <a:endParaRPr b="0" lang="en-GB" sz="3200" spc="-1" strike="noStrike">
+              <a:latin typeface="Arial"/>
             </a:endParaRPr>
           </a:p>
         </p:txBody>
@@ -182,7 +174,7 @@
       </p:grpSpPr>
       <p:sp>
         <p:nvSpPr>
-          <p:cNvPr id="29" name="PlaceHolder 1"/>
+          <p:cNvPr id="26" name="PlaceHolder 1"/>
           <p:cNvSpPr>
             <a:spLocks noGrp="1"/>
           </p:cNvSpPr>
@@ -192,8 +184,8 @@
         </p:nvSpPr>
         <p:spPr>
           <a:xfrm>
-            <a:off x="457200" y="274680"/>
-            <a:ext cx="8229240" cy="1142640"/>
+            <a:off x="457200" y="273600"/>
+            <a:ext cx="8229240" cy="1144800"/>
           </a:xfrm>
           <a:prstGeom prst="rect">
             <a:avLst/>
@@ -204,18 +196,16 @@
             <a:noAutofit/>
           </a:bodyPr>
           <a:p>
-            <a:endParaRPr b="0" lang="ru-RU" sz="4400" spc="-1" strike="noStrike">
-              <a:solidFill>
-                <a:srgbClr val="000000"/>
-              </a:solidFill>
-              <a:latin typeface="Arial"/>
-            </a:endParaRPr>
-          </a:p>
-        </p:txBody>
-      </p:sp>
-      <p:sp>
-        <p:nvSpPr>
-          <p:cNvPr id="30" name="PlaceHolder 2"/>
+            <a:pPr algn="ctr"/>
+            <a:endParaRPr b="0" lang="en-GB" sz="4400" spc="-1" strike="noStrike">
+              <a:latin typeface="Arial"/>
+            </a:endParaRPr>
+          </a:p>
+        </p:txBody>
+      </p:sp>
+      <p:sp>
+        <p:nvSpPr>
+          <p:cNvPr id="27" name="PlaceHolder 2"/>
           <p:cNvSpPr>
             <a:spLocks noGrp="1"/>
           </p:cNvSpPr>
@@ -225,8 +215,8 @@
         </p:nvSpPr>
         <p:spPr>
           <a:xfrm>
-            <a:off x="457200" y="1600200"/>
-            <a:ext cx="4015800" cy="2158560"/>
+            <a:off x="457200" y="1604520"/>
+            <a:ext cx="4015800" cy="1896840"/>
           </a:xfrm>
           <a:prstGeom prst="rect">
             <a:avLst/>
@@ -237,18 +227,15 @@
             <a:normAutofit/>
           </a:bodyPr>
           <a:p>
-            <a:endParaRPr b="0" lang="ru-RU" sz="3200" spc="-1" strike="noStrike">
-              <a:solidFill>
-                <a:srgbClr val="000000"/>
-              </a:solidFill>
-              <a:latin typeface="Calibri"/>
-            </a:endParaRPr>
-          </a:p>
-        </p:txBody>
-      </p:sp>
-      <p:sp>
-        <p:nvSpPr>
-          <p:cNvPr id="31" name="PlaceHolder 3"/>
+            <a:endParaRPr b="0" lang="en-GB" sz="3200" spc="-1" strike="noStrike">
+              <a:latin typeface="Arial"/>
+            </a:endParaRPr>
+          </a:p>
+        </p:txBody>
+      </p:sp>
+      <p:sp>
+        <p:nvSpPr>
+          <p:cNvPr id="28" name="PlaceHolder 3"/>
           <p:cNvSpPr>
             <a:spLocks noGrp="1"/>
           </p:cNvSpPr>
@@ -258,8 +245,8 @@
         </p:nvSpPr>
         <p:spPr>
           <a:xfrm>
-            <a:off x="4674240" y="1600200"/>
-            <a:ext cx="4015800" cy="2158560"/>
+            <a:off x="4674240" y="1604520"/>
+            <a:ext cx="4015800" cy="1896840"/>
           </a:xfrm>
           <a:prstGeom prst="rect">
             <a:avLst/>
@@ -270,18 +257,15 @@
             <a:normAutofit/>
           </a:bodyPr>
           <a:p>
-            <a:endParaRPr b="0" lang="ru-RU" sz="3200" spc="-1" strike="noStrike">
-              <a:solidFill>
-                <a:srgbClr val="000000"/>
-              </a:solidFill>
-              <a:latin typeface="Calibri"/>
-            </a:endParaRPr>
-          </a:p>
-        </p:txBody>
-      </p:sp>
-      <p:sp>
-        <p:nvSpPr>
-          <p:cNvPr id="32" name="PlaceHolder 4"/>
+            <a:endParaRPr b="0" lang="en-GB" sz="3200" spc="-1" strike="noStrike">
+              <a:latin typeface="Arial"/>
+            </a:endParaRPr>
+          </a:p>
+        </p:txBody>
+      </p:sp>
+      <p:sp>
+        <p:nvSpPr>
+          <p:cNvPr id="29" name="PlaceHolder 4"/>
           <p:cNvSpPr>
             <a:spLocks noGrp="1"/>
           </p:cNvSpPr>
@@ -291,8 +275,8 @@
         </p:nvSpPr>
         <p:spPr>
           <a:xfrm>
-            <a:off x="457200" y="3964320"/>
-            <a:ext cx="4015800" cy="2158560"/>
+            <a:off x="457200" y="3682080"/>
+            <a:ext cx="4015800" cy="1896840"/>
           </a:xfrm>
           <a:prstGeom prst="rect">
             <a:avLst/>
@@ -303,18 +287,15 @@
             <a:normAutofit/>
           </a:bodyPr>
           <a:p>
-            <a:endParaRPr b="0" lang="ru-RU" sz="3200" spc="-1" strike="noStrike">
-              <a:solidFill>
-                <a:srgbClr val="000000"/>
-              </a:solidFill>
-              <a:latin typeface="Calibri"/>
-            </a:endParaRPr>
-          </a:p>
-        </p:txBody>
-      </p:sp>
-      <p:sp>
-        <p:nvSpPr>
-          <p:cNvPr id="33" name="PlaceHolder 5"/>
+            <a:endParaRPr b="0" lang="en-GB" sz="3200" spc="-1" strike="noStrike">
+              <a:latin typeface="Arial"/>
+            </a:endParaRPr>
+          </a:p>
+        </p:txBody>
+      </p:sp>
+      <p:sp>
+        <p:nvSpPr>
+          <p:cNvPr id="30" name="PlaceHolder 5"/>
           <p:cNvSpPr>
             <a:spLocks noGrp="1"/>
           </p:cNvSpPr>
@@ -324,8 +305,8 @@
         </p:nvSpPr>
         <p:spPr>
           <a:xfrm>
-            <a:off x="4674240" y="3964320"/>
-            <a:ext cx="4015800" cy="2158560"/>
+            <a:off x="4674240" y="3682080"/>
+            <a:ext cx="4015800" cy="1896840"/>
           </a:xfrm>
           <a:prstGeom prst="rect">
             <a:avLst/>
@@ -336,11 +317,8 @@
             <a:normAutofit/>
           </a:bodyPr>
           <a:p>
-            <a:endParaRPr b="0" lang="ru-RU" sz="3200" spc="-1" strike="noStrike">
-              <a:solidFill>
-                <a:srgbClr val="000000"/>
-              </a:solidFill>
-              <a:latin typeface="Calibri"/>
+            <a:endParaRPr b="0" lang="en-GB" sz="3200" spc="-1" strike="noStrike">
+              <a:latin typeface="Arial"/>
             </a:endParaRPr>
           </a:p>
         </p:txBody>
@@ -369,7 +347,7 @@
       </p:grpSpPr>
       <p:sp>
         <p:nvSpPr>
-          <p:cNvPr id="34" name="PlaceHolder 1"/>
+          <p:cNvPr id="31" name="PlaceHolder 1"/>
           <p:cNvSpPr>
             <a:spLocks noGrp="1"/>
           </p:cNvSpPr>
@@ -379,8 +357,8 @@
         </p:nvSpPr>
         <p:spPr>
           <a:xfrm>
-            <a:off x="457200" y="274680"/>
-            <a:ext cx="8229240" cy="1142640"/>
+            <a:off x="457200" y="273600"/>
+            <a:ext cx="8229240" cy="1144800"/>
           </a:xfrm>
           <a:prstGeom prst="rect">
             <a:avLst/>
@@ -391,18 +369,16 @@
             <a:noAutofit/>
           </a:bodyPr>
           <a:p>
-            <a:endParaRPr b="0" lang="ru-RU" sz="4400" spc="-1" strike="noStrike">
-              <a:solidFill>
-                <a:srgbClr val="000000"/>
-              </a:solidFill>
-              <a:latin typeface="Arial"/>
-            </a:endParaRPr>
-          </a:p>
-        </p:txBody>
-      </p:sp>
-      <p:sp>
-        <p:nvSpPr>
-          <p:cNvPr id="35" name="PlaceHolder 2"/>
+            <a:pPr algn="ctr"/>
+            <a:endParaRPr b="0" lang="en-GB" sz="4400" spc="-1" strike="noStrike">
+              <a:latin typeface="Arial"/>
+            </a:endParaRPr>
+          </a:p>
+        </p:txBody>
+      </p:sp>
+      <p:sp>
+        <p:nvSpPr>
+          <p:cNvPr id="32" name="PlaceHolder 2"/>
           <p:cNvSpPr>
             <a:spLocks noGrp="1"/>
           </p:cNvSpPr>
@@ -412,8 +388,8 @@
         </p:nvSpPr>
         <p:spPr>
           <a:xfrm>
-            <a:off x="457200" y="1600200"/>
-            <a:ext cx="2649600" cy="2158560"/>
+            <a:off x="457200" y="1604520"/>
+            <a:ext cx="2649600" cy="1896840"/>
           </a:xfrm>
           <a:prstGeom prst="rect">
             <a:avLst/>
@@ -424,18 +400,15 @@
             <a:normAutofit/>
           </a:bodyPr>
           <a:p>
-            <a:endParaRPr b="0" lang="ru-RU" sz="3200" spc="-1" strike="noStrike">
-              <a:solidFill>
-                <a:srgbClr val="000000"/>
-              </a:solidFill>
-              <a:latin typeface="Calibri"/>
-            </a:endParaRPr>
-          </a:p>
-        </p:txBody>
-      </p:sp>
-      <p:sp>
-        <p:nvSpPr>
-          <p:cNvPr id="36" name="PlaceHolder 3"/>
+            <a:endParaRPr b="0" lang="en-GB" sz="3200" spc="-1" strike="noStrike">
+              <a:latin typeface="Arial"/>
+            </a:endParaRPr>
+          </a:p>
+        </p:txBody>
+      </p:sp>
+      <p:sp>
+        <p:nvSpPr>
+          <p:cNvPr id="33" name="PlaceHolder 3"/>
           <p:cNvSpPr>
             <a:spLocks noGrp="1"/>
           </p:cNvSpPr>
@@ -445,8 +418,8 @@
         </p:nvSpPr>
         <p:spPr>
           <a:xfrm>
-            <a:off x="3239640" y="1600200"/>
-            <a:ext cx="2649600" cy="2158560"/>
+            <a:off x="3239640" y="1604520"/>
+            <a:ext cx="2649600" cy="1896840"/>
           </a:xfrm>
           <a:prstGeom prst="rect">
             <a:avLst/>
@@ -457,18 +430,15 @@
             <a:normAutofit/>
           </a:bodyPr>
           <a:p>
-            <a:endParaRPr b="0" lang="ru-RU" sz="3200" spc="-1" strike="noStrike">
-              <a:solidFill>
-                <a:srgbClr val="000000"/>
-              </a:solidFill>
-              <a:latin typeface="Calibri"/>
-            </a:endParaRPr>
-          </a:p>
-        </p:txBody>
-      </p:sp>
-      <p:sp>
-        <p:nvSpPr>
-          <p:cNvPr id="37" name="PlaceHolder 4"/>
+            <a:endParaRPr b="0" lang="en-GB" sz="3200" spc="-1" strike="noStrike">
+              <a:latin typeface="Arial"/>
+            </a:endParaRPr>
+          </a:p>
+        </p:txBody>
+      </p:sp>
+      <p:sp>
+        <p:nvSpPr>
+          <p:cNvPr id="34" name="PlaceHolder 4"/>
           <p:cNvSpPr>
             <a:spLocks noGrp="1"/>
           </p:cNvSpPr>
@@ -478,8 +448,8 @@
         </p:nvSpPr>
         <p:spPr>
           <a:xfrm>
-            <a:off x="6022080" y="1600200"/>
-            <a:ext cx="2649600" cy="2158560"/>
+            <a:off x="6022080" y="1604520"/>
+            <a:ext cx="2649600" cy="1896840"/>
           </a:xfrm>
           <a:prstGeom prst="rect">
             <a:avLst/>
@@ -490,18 +460,15 @@
             <a:normAutofit/>
           </a:bodyPr>
           <a:p>
-            <a:endParaRPr b="0" lang="ru-RU" sz="3200" spc="-1" strike="noStrike">
-              <a:solidFill>
-                <a:srgbClr val="000000"/>
-              </a:solidFill>
-              <a:latin typeface="Calibri"/>
-            </a:endParaRPr>
-          </a:p>
-        </p:txBody>
-      </p:sp>
-      <p:sp>
-        <p:nvSpPr>
-          <p:cNvPr id="38" name="PlaceHolder 5"/>
+            <a:endParaRPr b="0" lang="en-GB" sz="3200" spc="-1" strike="noStrike">
+              <a:latin typeface="Arial"/>
+            </a:endParaRPr>
+          </a:p>
+        </p:txBody>
+      </p:sp>
+      <p:sp>
+        <p:nvSpPr>
+          <p:cNvPr id="35" name="PlaceHolder 5"/>
           <p:cNvSpPr>
             <a:spLocks noGrp="1"/>
           </p:cNvSpPr>
@@ -511,8 +478,8 @@
         </p:nvSpPr>
         <p:spPr>
           <a:xfrm>
-            <a:off x="457200" y="3964320"/>
-            <a:ext cx="2649600" cy="2158560"/>
+            <a:off x="457200" y="3682080"/>
+            <a:ext cx="2649600" cy="1896840"/>
           </a:xfrm>
           <a:prstGeom prst="rect">
             <a:avLst/>
@@ -523,18 +490,15 @@
             <a:normAutofit/>
           </a:bodyPr>
           <a:p>
-            <a:endParaRPr b="0" lang="ru-RU" sz="3200" spc="-1" strike="noStrike">
-              <a:solidFill>
-                <a:srgbClr val="000000"/>
-              </a:solidFill>
-              <a:latin typeface="Calibri"/>
-            </a:endParaRPr>
-          </a:p>
-        </p:txBody>
-      </p:sp>
-      <p:sp>
-        <p:nvSpPr>
-          <p:cNvPr id="39" name="PlaceHolder 6"/>
+            <a:endParaRPr b="0" lang="en-GB" sz="3200" spc="-1" strike="noStrike">
+              <a:latin typeface="Arial"/>
+            </a:endParaRPr>
+          </a:p>
+        </p:txBody>
+      </p:sp>
+      <p:sp>
+        <p:nvSpPr>
+          <p:cNvPr id="36" name="PlaceHolder 6"/>
           <p:cNvSpPr>
             <a:spLocks noGrp="1"/>
           </p:cNvSpPr>
@@ -544,8 +508,8 @@
         </p:nvSpPr>
         <p:spPr>
           <a:xfrm>
-            <a:off x="3239640" y="3964320"/>
-            <a:ext cx="2649600" cy="2158560"/>
+            <a:off x="3239640" y="3682080"/>
+            <a:ext cx="2649600" cy="1896840"/>
           </a:xfrm>
           <a:prstGeom prst="rect">
             <a:avLst/>
@@ -556,18 +520,15 @@
             <a:normAutofit/>
           </a:bodyPr>
           <a:p>
-            <a:endParaRPr b="0" lang="ru-RU" sz="3200" spc="-1" strike="noStrike">
-              <a:solidFill>
-                <a:srgbClr val="000000"/>
-              </a:solidFill>
-              <a:latin typeface="Calibri"/>
-            </a:endParaRPr>
-          </a:p>
-        </p:txBody>
-      </p:sp>
-      <p:sp>
-        <p:nvSpPr>
-          <p:cNvPr id="40" name="PlaceHolder 7"/>
+            <a:endParaRPr b="0" lang="en-GB" sz="3200" spc="-1" strike="noStrike">
+              <a:latin typeface="Arial"/>
+            </a:endParaRPr>
+          </a:p>
+        </p:txBody>
+      </p:sp>
+      <p:sp>
+        <p:nvSpPr>
+          <p:cNvPr id="37" name="PlaceHolder 7"/>
           <p:cNvSpPr>
             <a:spLocks noGrp="1"/>
           </p:cNvSpPr>
@@ -577,8 +538,8 @@
         </p:nvSpPr>
         <p:spPr>
           <a:xfrm>
-            <a:off x="6022080" y="3964320"/>
-            <a:ext cx="2649600" cy="2158560"/>
+            <a:off x="6022080" y="3682080"/>
+            <a:ext cx="2649600" cy="1896840"/>
           </a:xfrm>
           <a:prstGeom prst="rect">
             <a:avLst/>
@@ -589,11 +550,8 @@
             <a:normAutofit/>
           </a:bodyPr>
           <a:p>
-            <a:endParaRPr b="0" lang="ru-RU" sz="3200" spc="-1" strike="noStrike">
-              <a:solidFill>
-                <a:srgbClr val="000000"/>
-              </a:solidFill>
-              <a:latin typeface="Calibri"/>
+            <a:endParaRPr b="0" lang="en-GB" sz="3200" spc="-1" strike="noStrike">
+              <a:latin typeface="Arial"/>
             </a:endParaRPr>
           </a:p>
         </p:txBody>
@@ -644,7 +602,7 @@
       </p:grpSpPr>
       <p:sp>
         <p:nvSpPr>
-          <p:cNvPr id="46" name="PlaceHolder 1"/>
+          <p:cNvPr id="40" name="PlaceHolder 1"/>
           <p:cNvSpPr>
             <a:spLocks noGrp="1"/>
           </p:cNvSpPr>
@@ -654,8 +612,8 @@
         </p:nvSpPr>
         <p:spPr>
           <a:xfrm>
-            <a:off x="457200" y="274680"/>
-            <a:ext cx="8229240" cy="1142640"/>
+            <a:off x="457200" y="273600"/>
+            <a:ext cx="8229240" cy="1144800"/>
           </a:xfrm>
           <a:prstGeom prst="rect">
             <a:avLst/>
@@ -666,18 +624,16 @@
             <a:noAutofit/>
           </a:bodyPr>
           <a:p>
-            <a:endParaRPr b="0" lang="ru-RU" sz="4400" spc="-1" strike="noStrike">
-              <a:solidFill>
-                <a:srgbClr val="000000"/>
-              </a:solidFill>
-              <a:latin typeface="Arial"/>
-            </a:endParaRPr>
-          </a:p>
-        </p:txBody>
-      </p:sp>
-      <p:sp>
-        <p:nvSpPr>
-          <p:cNvPr id="47" name="PlaceHolder 2"/>
+            <a:pPr algn="ctr"/>
+            <a:endParaRPr b="0" lang="en-GB" sz="4400" spc="-1" strike="noStrike">
+              <a:latin typeface="Arial"/>
+            </a:endParaRPr>
+          </a:p>
+        </p:txBody>
+      </p:sp>
+      <p:sp>
+        <p:nvSpPr>
+          <p:cNvPr id="41" name="PlaceHolder 2"/>
           <p:cNvSpPr>
             <a:spLocks noGrp="1"/>
           </p:cNvSpPr>
@@ -687,8 +643,8 @@
         </p:nvSpPr>
         <p:spPr>
           <a:xfrm>
-            <a:off x="457200" y="1600200"/>
-            <a:ext cx="8229240" cy="4525560"/>
+            <a:off x="457200" y="1604520"/>
+            <a:ext cx="8229240" cy="3977280"/>
           </a:xfrm>
           <a:prstGeom prst="rect">
             <a:avLst/>
@@ -730,7 +686,7 @@
       </p:grpSpPr>
       <p:sp>
         <p:nvSpPr>
-          <p:cNvPr id="48" name="PlaceHolder 1"/>
+          <p:cNvPr id="42" name="PlaceHolder 1"/>
           <p:cNvSpPr>
             <a:spLocks noGrp="1"/>
           </p:cNvSpPr>
@@ -740,8 +696,8 @@
         </p:nvSpPr>
         <p:spPr>
           <a:xfrm>
-            <a:off x="457200" y="274680"/>
-            <a:ext cx="8229240" cy="1142640"/>
+            <a:off x="457200" y="273600"/>
+            <a:ext cx="8229240" cy="1144800"/>
           </a:xfrm>
           <a:prstGeom prst="rect">
             <a:avLst/>
@@ -752,18 +708,16 @@
             <a:noAutofit/>
           </a:bodyPr>
           <a:p>
-            <a:endParaRPr b="0" lang="ru-RU" sz="4400" spc="-1" strike="noStrike">
-              <a:solidFill>
-                <a:srgbClr val="000000"/>
-              </a:solidFill>
-              <a:latin typeface="Arial"/>
-            </a:endParaRPr>
-          </a:p>
-        </p:txBody>
-      </p:sp>
-      <p:sp>
-        <p:nvSpPr>
-          <p:cNvPr id="49" name="PlaceHolder 2"/>
+            <a:pPr algn="ctr"/>
+            <a:endParaRPr b="0" lang="en-GB" sz="4400" spc="-1" strike="noStrike">
+              <a:latin typeface="Arial"/>
+            </a:endParaRPr>
+          </a:p>
+        </p:txBody>
+      </p:sp>
+      <p:sp>
+        <p:nvSpPr>
+          <p:cNvPr id="43" name="PlaceHolder 2"/>
           <p:cNvSpPr>
             <a:spLocks noGrp="1"/>
           </p:cNvSpPr>
@@ -773,8 +727,8 @@
         </p:nvSpPr>
         <p:spPr>
           <a:xfrm>
-            <a:off x="457200" y="1600200"/>
-            <a:ext cx="8229240" cy="4525560"/>
+            <a:off x="457200" y="1604520"/>
+            <a:ext cx="8229240" cy="3977280"/>
           </a:xfrm>
           <a:prstGeom prst="rect">
             <a:avLst/>
@@ -785,11 +739,8 @@
             <a:normAutofit/>
           </a:bodyPr>
           <a:p>
-            <a:endParaRPr b="0" lang="ru-RU" sz="3200" spc="-1" strike="noStrike">
-              <a:solidFill>
-                <a:srgbClr val="000000"/>
-              </a:solidFill>
-              <a:latin typeface="Calibri"/>
+            <a:endParaRPr b="0" lang="en-GB" sz="3200" spc="-1" strike="noStrike">
+              <a:latin typeface="Arial"/>
             </a:endParaRPr>
           </a:p>
         </p:txBody>
@@ -818,7 +769,7 @@
       </p:grpSpPr>
       <p:sp>
         <p:nvSpPr>
-          <p:cNvPr id="50" name="PlaceHolder 1"/>
+          <p:cNvPr id="44" name="PlaceHolder 1"/>
           <p:cNvSpPr>
             <a:spLocks noGrp="1"/>
           </p:cNvSpPr>
@@ -828,8 +779,8 @@
         </p:nvSpPr>
         <p:spPr>
           <a:xfrm>
-            <a:off x="457200" y="274680"/>
-            <a:ext cx="8229240" cy="1142640"/>
+            <a:off x="457200" y="273600"/>
+            <a:ext cx="8229240" cy="1144800"/>
           </a:xfrm>
           <a:prstGeom prst="rect">
             <a:avLst/>
@@ -840,18 +791,16 @@
             <a:noAutofit/>
           </a:bodyPr>
           <a:p>
-            <a:endParaRPr b="0" lang="ru-RU" sz="4400" spc="-1" strike="noStrike">
-              <a:solidFill>
-                <a:srgbClr val="000000"/>
-              </a:solidFill>
-              <a:latin typeface="Arial"/>
-            </a:endParaRPr>
-          </a:p>
-        </p:txBody>
-      </p:sp>
-      <p:sp>
-        <p:nvSpPr>
-          <p:cNvPr id="51" name="PlaceHolder 2"/>
+            <a:pPr algn="ctr"/>
+            <a:endParaRPr b="0" lang="en-GB" sz="4400" spc="-1" strike="noStrike">
+              <a:latin typeface="Arial"/>
+            </a:endParaRPr>
+          </a:p>
+        </p:txBody>
+      </p:sp>
+      <p:sp>
+        <p:nvSpPr>
+          <p:cNvPr id="45" name="PlaceHolder 2"/>
           <p:cNvSpPr>
             <a:spLocks noGrp="1"/>
           </p:cNvSpPr>
@@ -861,8 +810,8 @@
         </p:nvSpPr>
         <p:spPr>
           <a:xfrm>
-            <a:off x="457200" y="1600200"/>
-            <a:ext cx="4015800" cy="4525560"/>
+            <a:off x="457200" y="1604520"/>
+            <a:ext cx="4015800" cy="3977280"/>
           </a:xfrm>
           <a:prstGeom prst="rect">
             <a:avLst/>
@@ -873,18 +822,15 @@
             <a:normAutofit/>
           </a:bodyPr>
           <a:p>
-            <a:endParaRPr b="0" lang="ru-RU" sz="3200" spc="-1" strike="noStrike">
-              <a:solidFill>
-                <a:srgbClr val="000000"/>
-              </a:solidFill>
-              <a:latin typeface="Calibri"/>
-            </a:endParaRPr>
-          </a:p>
-        </p:txBody>
-      </p:sp>
-      <p:sp>
-        <p:nvSpPr>
-          <p:cNvPr id="52" name="PlaceHolder 3"/>
+            <a:endParaRPr b="0" lang="en-GB" sz="3200" spc="-1" strike="noStrike">
+              <a:latin typeface="Arial"/>
+            </a:endParaRPr>
+          </a:p>
+        </p:txBody>
+      </p:sp>
+      <p:sp>
+        <p:nvSpPr>
+          <p:cNvPr id="46" name="PlaceHolder 3"/>
           <p:cNvSpPr>
             <a:spLocks noGrp="1"/>
           </p:cNvSpPr>
@@ -894,8 +840,8 @@
         </p:nvSpPr>
         <p:spPr>
           <a:xfrm>
-            <a:off x="4674240" y="1600200"/>
-            <a:ext cx="4015800" cy="4525560"/>
+            <a:off x="4674240" y="1604520"/>
+            <a:ext cx="4015800" cy="3977280"/>
           </a:xfrm>
           <a:prstGeom prst="rect">
             <a:avLst/>
@@ -906,11 +852,8 @@
             <a:normAutofit/>
           </a:bodyPr>
           <a:p>
-            <a:endParaRPr b="0" lang="ru-RU" sz="3200" spc="-1" strike="noStrike">
-              <a:solidFill>
-                <a:srgbClr val="000000"/>
-              </a:solidFill>
-              <a:latin typeface="Calibri"/>
+            <a:endParaRPr b="0" lang="en-GB" sz="3200" spc="-1" strike="noStrike">
+              <a:latin typeface="Arial"/>
             </a:endParaRPr>
           </a:p>
         </p:txBody>
@@ -939,7 +882,7 @@
       </p:grpSpPr>
       <p:sp>
         <p:nvSpPr>
-          <p:cNvPr id="53" name="PlaceHolder 1"/>
+          <p:cNvPr id="47" name="PlaceHolder 1"/>
           <p:cNvSpPr>
             <a:spLocks noGrp="1"/>
           </p:cNvSpPr>
@@ -949,8 +892,8 @@
         </p:nvSpPr>
         <p:spPr>
           <a:xfrm>
-            <a:off x="457200" y="274680"/>
-            <a:ext cx="8229240" cy="1142640"/>
+            <a:off x="457200" y="273600"/>
+            <a:ext cx="8229240" cy="1144800"/>
           </a:xfrm>
           <a:prstGeom prst="rect">
             <a:avLst/>
@@ -961,10 +904,8 @@
             <a:noAutofit/>
           </a:bodyPr>
           <a:p>
-            <a:endParaRPr b="0" lang="ru-RU" sz="4400" spc="-1" strike="noStrike">
-              <a:solidFill>
-                <a:srgbClr val="000000"/>
-              </a:solidFill>
+            <a:pPr algn="ctr"/>
+            <a:endParaRPr b="0" lang="en-GB" sz="4400" spc="-1" strike="noStrike">
               <a:latin typeface="Arial"/>
             </a:endParaRPr>
           </a:p>
@@ -994,7 +935,7 @@
       </p:grpSpPr>
       <p:sp>
         <p:nvSpPr>
-          <p:cNvPr id="54" name="PlaceHolder 1"/>
+          <p:cNvPr id="48" name="PlaceHolder 1"/>
           <p:cNvSpPr>
             <a:spLocks noGrp="1"/>
           </p:cNvSpPr>
@@ -1004,8 +945,8 @@
         </p:nvSpPr>
         <p:spPr>
           <a:xfrm>
-            <a:off x="457200" y="274680"/>
-            <a:ext cx="8229240" cy="5297760"/>
+            <a:off x="457200" y="273600"/>
+            <a:ext cx="8229240" cy="5307840"/>
           </a:xfrm>
           <a:prstGeom prst="rect">
             <a:avLst/>
@@ -1047,7 +988,7 @@
       </p:grpSpPr>
       <p:sp>
         <p:nvSpPr>
-          <p:cNvPr id="55" name="PlaceHolder 1"/>
+          <p:cNvPr id="49" name="PlaceHolder 1"/>
           <p:cNvSpPr>
             <a:spLocks noGrp="1"/>
           </p:cNvSpPr>
@@ -1057,8 +998,8 @@
         </p:nvSpPr>
         <p:spPr>
           <a:xfrm>
-            <a:off x="457200" y="274680"/>
-            <a:ext cx="8229240" cy="1142640"/>
+            <a:off x="457200" y="273600"/>
+            <a:ext cx="8229240" cy="1144800"/>
           </a:xfrm>
           <a:prstGeom prst="rect">
             <a:avLst/>
@@ -1069,18 +1010,16 @@
             <a:noAutofit/>
           </a:bodyPr>
           <a:p>
-            <a:endParaRPr b="0" lang="ru-RU" sz="4400" spc="-1" strike="noStrike">
-              <a:solidFill>
-                <a:srgbClr val="000000"/>
-              </a:solidFill>
-              <a:latin typeface="Arial"/>
-            </a:endParaRPr>
-          </a:p>
-        </p:txBody>
-      </p:sp>
-      <p:sp>
-        <p:nvSpPr>
-          <p:cNvPr id="56" name="PlaceHolder 2"/>
+            <a:pPr algn="ctr"/>
+            <a:endParaRPr b="0" lang="en-GB" sz="4400" spc="-1" strike="noStrike">
+              <a:latin typeface="Arial"/>
+            </a:endParaRPr>
+          </a:p>
+        </p:txBody>
+      </p:sp>
+      <p:sp>
+        <p:nvSpPr>
+          <p:cNvPr id="50" name="PlaceHolder 2"/>
           <p:cNvSpPr>
             <a:spLocks noGrp="1"/>
           </p:cNvSpPr>
@@ -1090,8 +1029,8 @@
         </p:nvSpPr>
         <p:spPr>
           <a:xfrm>
-            <a:off x="457200" y="1600200"/>
-            <a:ext cx="4015800" cy="2158560"/>
+            <a:off x="457200" y="1604520"/>
+            <a:ext cx="4015800" cy="1896840"/>
           </a:xfrm>
           <a:prstGeom prst="rect">
             <a:avLst/>
@@ -1102,18 +1041,15 @@
             <a:normAutofit/>
           </a:bodyPr>
           <a:p>
-            <a:endParaRPr b="0" lang="ru-RU" sz="3200" spc="-1" strike="noStrike">
-              <a:solidFill>
-                <a:srgbClr val="000000"/>
-              </a:solidFill>
-              <a:latin typeface="Calibri"/>
-            </a:endParaRPr>
-          </a:p>
-        </p:txBody>
-      </p:sp>
-      <p:sp>
-        <p:nvSpPr>
-          <p:cNvPr id="57" name="PlaceHolder 3"/>
+            <a:endParaRPr b="0" lang="en-GB" sz="3200" spc="-1" strike="noStrike">
+              <a:latin typeface="Arial"/>
+            </a:endParaRPr>
+          </a:p>
+        </p:txBody>
+      </p:sp>
+      <p:sp>
+        <p:nvSpPr>
+          <p:cNvPr id="51" name="PlaceHolder 3"/>
           <p:cNvSpPr>
             <a:spLocks noGrp="1"/>
           </p:cNvSpPr>
@@ -1123,8 +1059,8 @@
         </p:nvSpPr>
         <p:spPr>
           <a:xfrm>
-            <a:off x="4674240" y="1600200"/>
-            <a:ext cx="4015800" cy="4525560"/>
+            <a:off x="4674240" y="1604520"/>
+            <a:ext cx="4015800" cy="3977280"/>
           </a:xfrm>
           <a:prstGeom prst="rect">
             <a:avLst/>
@@ -1135,18 +1071,15 @@
             <a:normAutofit/>
           </a:bodyPr>
           <a:p>
-            <a:endParaRPr b="0" lang="ru-RU" sz="3200" spc="-1" strike="noStrike">
-              <a:solidFill>
-                <a:srgbClr val="000000"/>
-              </a:solidFill>
-              <a:latin typeface="Calibri"/>
-            </a:endParaRPr>
-          </a:p>
-        </p:txBody>
-      </p:sp>
-      <p:sp>
-        <p:nvSpPr>
-          <p:cNvPr id="58" name="PlaceHolder 4"/>
+            <a:endParaRPr b="0" lang="en-GB" sz="3200" spc="-1" strike="noStrike">
+              <a:latin typeface="Arial"/>
+            </a:endParaRPr>
+          </a:p>
+        </p:txBody>
+      </p:sp>
+      <p:sp>
+        <p:nvSpPr>
+          <p:cNvPr id="52" name="PlaceHolder 4"/>
           <p:cNvSpPr>
             <a:spLocks noGrp="1"/>
           </p:cNvSpPr>
@@ -1156,8 +1089,8 @@
         </p:nvSpPr>
         <p:spPr>
           <a:xfrm>
-            <a:off x="457200" y="3964320"/>
-            <a:ext cx="4015800" cy="2158560"/>
+            <a:off x="457200" y="3682080"/>
+            <a:ext cx="4015800" cy="1896840"/>
           </a:xfrm>
           <a:prstGeom prst="rect">
             <a:avLst/>
@@ -1168,11 +1101,8 @@
             <a:normAutofit/>
           </a:bodyPr>
           <a:p>
-            <a:endParaRPr b="0" lang="ru-RU" sz="3200" spc="-1" strike="noStrike">
-              <a:solidFill>
-                <a:srgbClr val="000000"/>
-              </a:solidFill>
-              <a:latin typeface="Calibri"/>
+            <a:endParaRPr b="0" lang="en-GB" sz="3200" spc="-1" strike="noStrike">
+              <a:latin typeface="Arial"/>
             </a:endParaRPr>
           </a:p>
         </p:txBody>
@@ -1201,7 +1131,7 @@
       </p:grpSpPr>
       <p:sp>
         <p:nvSpPr>
-          <p:cNvPr id="5" name="PlaceHolder 1"/>
+          <p:cNvPr id="2" name="PlaceHolder 1"/>
           <p:cNvSpPr>
             <a:spLocks noGrp="1"/>
           </p:cNvSpPr>
@@ -1211,8 +1141,8 @@
         </p:nvSpPr>
         <p:spPr>
           <a:xfrm>
-            <a:off x="457200" y="274680"/>
-            <a:ext cx="8229240" cy="1142640"/>
+            <a:off x="457200" y="273600"/>
+            <a:ext cx="8229240" cy="1144800"/>
           </a:xfrm>
           <a:prstGeom prst="rect">
             <a:avLst/>
@@ -1223,18 +1153,16 @@
             <a:noAutofit/>
           </a:bodyPr>
           <a:p>
-            <a:endParaRPr b="0" lang="ru-RU" sz="4400" spc="-1" strike="noStrike">
-              <a:solidFill>
-                <a:srgbClr val="000000"/>
-              </a:solidFill>
-              <a:latin typeface="Arial"/>
-            </a:endParaRPr>
-          </a:p>
-        </p:txBody>
-      </p:sp>
-      <p:sp>
-        <p:nvSpPr>
-          <p:cNvPr id="6" name="PlaceHolder 2"/>
+            <a:pPr algn="ctr"/>
+            <a:endParaRPr b="0" lang="en-GB" sz="4400" spc="-1" strike="noStrike">
+              <a:latin typeface="Arial"/>
+            </a:endParaRPr>
+          </a:p>
+        </p:txBody>
+      </p:sp>
+      <p:sp>
+        <p:nvSpPr>
+          <p:cNvPr id="3" name="PlaceHolder 2"/>
           <p:cNvSpPr>
             <a:spLocks noGrp="1"/>
           </p:cNvSpPr>
@@ -1244,8 +1172,8 @@
         </p:nvSpPr>
         <p:spPr>
           <a:xfrm>
-            <a:off x="457200" y="1600200"/>
-            <a:ext cx="8229240" cy="4525560"/>
+            <a:off x="457200" y="1604520"/>
+            <a:ext cx="8229240" cy="3977280"/>
           </a:xfrm>
           <a:prstGeom prst="rect">
             <a:avLst/>
@@ -1287,7 +1215,7 @@
       </p:grpSpPr>
       <p:sp>
         <p:nvSpPr>
-          <p:cNvPr id="59" name="PlaceHolder 1"/>
+          <p:cNvPr id="53" name="PlaceHolder 1"/>
           <p:cNvSpPr>
             <a:spLocks noGrp="1"/>
           </p:cNvSpPr>
@@ -1297,8 +1225,8 @@
         </p:nvSpPr>
         <p:spPr>
           <a:xfrm>
-            <a:off x="457200" y="274680"/>
-            <a:ext cx="8229240" cy="1142640"/>
+            <a:off x="457200" y="273600"/>
+            <a:ext cx="8229240" cy="1144800"/>
           </a:xfrm>
           <a:prstGeom prst="rect">
             <a:avLst/>
@@ -1309,18 +1237,16 @@
             <a:noAutofit/>
           </a:bodyPr>
           <a:p>
-            <a:endParaRPr b="0" lang="ru-RU" sz="4400" spc="-1" strike="noStrike">
-              <a:solidFill>
-                <a:srgbClr val="000000"/>
-              </a:solidFill>
-              <a:latin typeface="Arial"/>
-            </a:endParaRPr>
-          </a:p>
-        </p:txBody>
-      </p:sp>
-      <p:sp>
-        <p:nvSpPr>
-          <p:cNvPr id="60" name="PlaceHolder 2"/>
+            <a:pPr algn="ctr"/>
+            <a:endParaRPr b="0" lang="en-GB" sz="4400" spc="-1" strike="noStrike">
+              <a:latin typeface="Arial"/>
+            </a:endParaRPr>
+          </a:p>
+        </p:txBody>
+      </p:sp>
+      <p:sp>
+        <p:nvSpPr>
+          <p:cNvPr id="54" name="PlaceHolder 2"/>
           <p:cNvSpPr>
             <a:spLocks noGrp="1"/>
           </p:cNvSpPr>
@@ -1330,8 +1256,8 @@
         </p:nvSpPr>
         <p:spPr>
           <a:xfrm>
-            <a:off x="457200" y="1600200"/>
-            <a:ext cx="4015800" cy="4525560"/>
+            <a:off x="457200" y="1604520"/>
+            <a:ext cx="4015800" cy="3977280"/>
           </a:xfrm>
           <a:prstGeom prst="rect">
             <a:avLst/>
@@ -1342,18 +1268,15 @@
             <a:normAutofit/>
           </a:bodyPr>
           <a:p>
-            <a:endParaRPr b="0" lang="ru-RU" sz="3200" spc="-1" strike="noStrike">
-              <a:solidFill>
-                <a:srgbClr val="000000"/>
-              </a:solidFill>
-              <a:latin typeface="Calibri"/>
-            </a:endParaRPr>
-          </a:p>
-        </p:txBody>
-      </p:sp>
-      <p:sp>
-        <p:nvSpPr>
-          <p:cNvPr id="61" name="PlaceHolder 3"/>
+            <a:endParaRPr b="0" lang="en-GB" sz="3200" spc="-1" strike="noStrike">
+              <a:latin typeface="Arial"/>
+            </a:endParaRPr>
+          </a:p>
+        </p:txBody>
+      </p:sp>
+      <p:sp>
+        <p:nvSpPr>
+          <p:cNvPr id="55" name="PlaceHolder 3"/>
           <p:cNvSpPr>
             <a:spLocks noGrp="1"/>
           </p:cNvSpPr>
@@ -1363,8 +1286,8 @@
         </p:nvSpPr>
         <p:spPr>
           <a:xfrm>
-            <a:off x="4674240" y="1600200"/>
-            <a:ext cx="4015800" cy="2158560"/>
+            <a:off x="4674240" y="1604520"/>
+            <a:ext cx="4015800" cy="1896840"/>
           </a:xfrm>
           <a:prstGeom prst="rect">
             <a:avLst/>
@@ -1375,18 +1298,15 @@
             <a:normAutofit/>
           </a:bodyPr>
           <a:p>
-            <a:endParaRPr b="0" lang="ru-RU" sz="3200" spc="-1" strike="noStrike">
-              <a:solidFill>
-                <a:srgbClr val="000000"/>
-              </a:solidFill>
-              <a:latin typeface="Calibri"/>
-            </a:endParaRPr>
-          </a:p>
-        </p:txBody>
-      </p:sp>
-      <p:sp>
-        <p:nvSpPr>
-          <p:cNvPr id="62" name="PlaceHolder 4"/>
+            <a:endParaRPr b="0" lang="en-GB" sz="3200" spc="-1" strike="noStrike">
+              <a:latin typeface="Arial"/>
+            </a:endParaRPr>
+          </a:p>
+        </p:txBody>
+      </p:sp>
+      <p:sp>
+        <p:nvSpPr>
+          <p:cNvPr id="56" name="PlaceHolder 4"/>
           <p:cNvSpPr>
             <a:spLocks noGrp="1"/>
           </p:cNvSpPr>
@@ -1396,8 +1316,8 @@
         </p:nvSpPr>
         <p:spPr>
           <a:xfrm>
-            <a:off x="4674240" y="3964320"/>
-            <a:ext cx="4015800" cy="2158560"/>
+            <a:off x="4674240" y="3682080"/>
+            <a:ext cx="4015800" cy="1896840"/>
           </a:xfrm>
           <a:prstGeom prst="rect">
             <a:avLst/>
@@ -1408,11 +1328,8 @@
             <a:normAutofit/>
           </a:bodyPr>
           <a:p>
-            <a:endParaRPr b="0" lang="ru-RU" sz="3200" spc="-1" strike="noStrike">
-              <a:solidFill>
-                <a:srgbClr val="000000"/>
-              </a:solidFill>
-              <a:latin typeface="Calibri"/>
+            <a:endParaRPr b="0" lang="en-GB" sz="3200" spc="-1" strike="noStrike">
+              <a:latin typeface="Arial"/>
             </a:endParaRPr>
           </a:p>
         </p:txBody>
@@ -1441,7 +1358,7 @@
       </p:grpSpPr>
       <p:sp>
         <p:nvSpPr>
-          <p:cNvPr id="63" name="PlaceHolder 1"/>
+          <p:cNvPr id="57" name="PlaceHolder 1"/>
           <p:cNvSpPr>
             <a:spLocks noGrp="1"/>
           </p:cNvSpPr>
@@ -1451,8 +1368,8 @@
         </p:nvSpPr>
         <p:spPr>
           <a:xfrm>
-            <a:off x="457200" y="274680"/>
-            <a:ext cx="8229240" cy="1142640"/>
+            <a:off x="457200" y="273600"/>
+            <a:ext cx="8229240" cy="1144800"/>
           </a:xfrm>
           <a:prstGeom prst="rect">
             <a:avLst/>
@@ -1463,18 +1380,16 @@
             <a:noAutofit/>
           </a:bodyPr>
           <a:p>
-            <a:endParaRPr b="0" lang="ru-RU" sz="4400" spc="-1" strike="noStrike">
-              <a:solidFill>
-                <a:srgbClr val="000000"/>
-              </a:solidFill>
-              <a:latin typeface="Arial"/>
-            </a:endParaRPr>
-          </a:p>
-        </p:txBody>
-      </p:sp>
-      <p:sp>
-        <p:nvSpPr>
-          <p:cNvPr id="64" name="PlaceHolder 2"/>
+            <a:pPr algn="ctr"/>
+            <a:endParaRPr b="0" lang="en-GB" sz="4400" spc="-1" strike="noStrike">
+              <a:latin typeface="Arial"/>
+            </a:endParaRPr>
+          </a:p>
+        </p:txBody>
+      </p:sp>
+      <p:sp>
+        <p:nvSpPr>
+          <p:cNvPr id="58" name="PlaceHolder 2"/>
           <p:cNvSpPr>
             <a:spLocks noGrp="1"/>
           </p:cNvSpPr>
@@ -1484,8 +1399,8 @@
         </p:nvSpPr>
         <p:spPr>
           <a:xfrm>
-            <a:off x="457200" y="1600200"/>
-            <a:ext cx="4015800" cy="2158560"/>
+            <a:off x="457200" y="1604520"/>
+            <a:ext cx="4015800" cy="1896840"/>
           </a:xfrm>
           <a:prstGeom prst="rect">
             <a:avLst/>
@@ -1496,18 +1411,15 @@
             <a:normAutofit/>
           </a:bodyPr>
           <a:p>
-            <a:endParaRPr b="0" lang="ru-RU" sz="3200" spc="-1" strike="noStrike">
-              <a:solidFill>
-                <a:srgbClr val="000000"/>
-              </a:solidFill>
-              <a:latin typeface="Calibri"/>
-            </a:endParaRPr>
-          </a:p>
-        </p:txBody>
-      </p:sp>
-      <p:sp>
-        <p:nvSpPr>
-          <p:cNvPr id="65" name="PlaceHolder 3"/>
+            <a:endParaRPr b="0" lang="en-GB" sz="3200" spc="-1" strike="noStrike">
+              <a:latin typeface="Arial"/>
+            </a:endParaRPr>
+          </a:p>
+        </p:txBody>
+      </p:sp>
+      <p:sp>
+        <p:nvSpPr>
+          <p:cNvPr id="59" name="PlaceHolder 3"/>
           <p:cNvSpPr>
             <a:spLocks noGrp="1"/>
           </p:cNvSpPr>
@@ -1517,8 +1429,8 @@
         </p:nvSpPr>
         <p:spPr>
           <a:xfrm>
-            <a:off x="4674240" y="1600200"/>
-            <a:ext cx="4015800" cy="2158560"/>
+            <a:off x="4674240" y="1604520"/>
+            <a:ext cx="4015800" cy="1896840"/>
           </a:xfrm>
           <a:prstGeom prst="rect">
             <a:avLst/>
@@ -1529,18 +1441,15 @@
             <a:normAutofit/>
           </a:bodyPr>
           <a:p>
-            <a:endParaRPr b="0" lang="ru-RU" sz="3200" spc="-1" strike="noStrike">
-              <a:solidFill>
-                <a:srgbClr val="000000"/>
-              </a:solidFill>
-              <a:latin typeface="Calibri"/>
-            </a:endParaRPr>
-          </a:p>
-        </p:txBody>
-      </p:sp>
-      <p:sp>
-        <p:nvSpPr>
-          <p:cNvPr id="66" name="PlaceHolder 4"/>
+            <a:endParaRPr b="0" lang="en-GB" sz="3200" spc="-1" strike="noStrike">
+              <a:latin typeface="Arial"/>
+            </a:endParaRPr>
+          </a:p>
+        </p:txBody>
+      </p:sp>
+      <p:sp>
+        <p:nvSpPr>
+          <p:cNvPr id="60" name="PlaceHolder 4"/>
           <p:cNvSpPr>
             <a:spLocks noGrp="1"/>
           </p:cNvSpPr>
@@ -1550,8 +1459,8 @@
         </p:nvSpPr>
         <p:spPr>
           <a:xfrm>
-            <a:off x="457200" y="3964320"/>
-            <a:ext cx="8229240" cy="2158560"/>
+            <a:off x="457200" y="3682080"/>
+            <a:ext cx="8229240" cy="1896840"/>
           </a:xfrm>
           <a:prstGeom prst="rect">
             <a:avLst/>
@@ -1562,11 +1471,8 @@
             <a:normAutofit/>
           </a:bodyPr>
           <a:p>
-            <a:endParaRPr b="0" lang="ru-RU" sz="3200" spc="-1" strike="noStrike">
-              <a:solidFill>
-                <a:srgbClr val="000000"/>
-              </a:solidFill>
-              <a:latin typeface="Calibri"/>
+            <a:endParaRPr b="0" lang="en-GB" sz="3200" spc="-1" strike="noStrike">
+              <a:latin typeface="Arial"/>
             </a:endParaRPr>
           </a:p>
         </p:txBody>
@@ -1595,7 +1501,7 @@
       </p:grpSpPr>
       <p:sp>
         <p:nvSpPr>
-          <p:cNvPr id="67" name="PlaceHolder 1"/>
+          <p:cNvPr id="61" name="PlaceHolder 1"/>
           <p:cNvSpPr>
             <a:spLocks noGrp="1"/>
           </p:cNvSpPr>
@@ -1605,8 +1511,8 @@
         </p:nvSpPr>
         <p:spPr>
           <a:xfrm>
-            <a:off x="457200" y="274680"/>
-            <a:ext cx="8229240" cy="1142640"/>
+            <a:off x="457200" y="273600"/>
+            <a:ext cx="8229240" cy="1144800"/>
           </a:xfrm>
           <a:prstGeom prst="rect">
             <a:avLst/>
@@ -1617,18 +1523,16 @@
             <a:noAutofit/>
           </a:bodyPr>
           <a:p>
-            <a:endParaRPr b="0" lang="ru-RU" sz="4400" spc="-1" strike="noStrike">
-              <a:solidFill>
-                <a:srgbClr val="000000"/>
-              </a:solidFill>
-              <a:latin typeface="Arial"/>
-            </a:endParaRPr>
-          </a:p>
-        </p:txBody>
-      </p:sp>
-      <p:sp>
-        <p:nvSpPr>
-          <p:cNvPr id="68" name="PlaceHolder 2"/>
+            <a:pPr algn="ctr"/>
+            <a:endParaRPr b="0" lang="en-GB" sz="4400" spc="-1" strike="noStrike">
+              <a:latin typeface="Arial"/>
+            </a:endParaRPr>
+          </a:p>
+        </p:txBody>
+      </p:sp>
+      <p:sp>
+        <p:nvSpPr>
+          <p:cNvPr id="62" name="PlaceHolder 2"/>
           <p:cNvSpPr>
             <a:spLocks noGrp="1"/>
           </p:cNvSpPr>
@@ -1638,8 +1542,8 @@
         </p:nvSpPr>
         <p:spPr>
           <a:xfrm>
-            <a:off x="457200" y="1600200"/>
-            <a:ext cx="8229240" cy="2158560"/>
+            <a:off x="457200" y="1604520"/>
+            <a:ext cx="8229240" cy="1896840"/>
           </a:xfrm>
           <a:prstGeom prst="rect">
             <a:avLst/>
@@ -1650,18 +1554,15 @@
             <a:normAutofit/>
           </a:bodyPr>
           <a:p>
-            <a:endParaRPr b="0" lang="ru-RU" sz="3200" spc="-1" strike="noStrike">
-              <a:solidFill>
-                <a:srgbClr val="000000"/>
-              </a:solidFill>
-              <a:latin typeface="Calibri"/>
-            </a:endParaRPr>
-          </a:p>
-        </p:txBody>
-      </p:sp>
-      <p:sp>
-        <p:nvSpPr>
-          <p:cNvPr id="69" name="PlaceHolder 3"/>
+            <a:endParaRPr b="0" lang="en-GB" sz="3200" spc="-1" strike="noStrike">
+              <a:latin typeface="Arial"/>
+            </a:endParaRPr>
+          </a:p>
+        </p:txBody>
+      </p:sp>
+      <p:sp>
+        <p:nvSpPr>
+          <p:cNvPr id="63" name="PlaceHolder 3"/>
           <p:cNvSpPr>
             <a:spLocks noGrp="1"/>
           </p:cNvSpPr>
@@ -1671,8 +1572,8 @@
         </p:nvSpPr>
         <p:spPr>
           <a:xfrm>
-            <a:off x="457200" y="3964320"/>
-            <a:ext cx="8229240" cy="2158560"/>
+            <a:off x="457200" y="3682080"/>
+            <a:ext cx="8229240" cy="1896840"/>
           </a:xfrm>
           <a:prstGeom prst="rect">
             <a:avLst/>
@@ -1683,11 +1584,8 @@
             <a:normAutofit/>
           </a:bodyPr>
           <a:p>
-            <a:endParaRPr b="0" lang="ru-RU" sz="3200" spc="-1" strike="noStrike">
-              <a:solidFill>
-                <a:srgbClr val="000000"/>
-              </a:solidFill>
-              <a:latin typeface="Calibri"/>
+            <a:endParaRPr b="0" lang="en-GB" sz="3200" spc="-1" strike="noStrike">
+              <a:latin typeface="Arial"/>
             </a:endParaRPr>
           </a:p>
         </p:txBody>
@@ -1716,7 +1614,7 @@
       </p:grpSpPr>
       <p:sp>
         <p:nvSpPr>
-          <p:cNvPr id="70" name="PlaceHolder 1"/>
+          <p:cNvPr id="64" name="PlaceHolder 1"/>
           <p:cNvSpPr>
             <a:spLocks noGrp="1"/>
           </p:cNvSpPr>
@@ -1726,8 +1624,8 @@
         </p:nvSpPr>
         <p:spPr>
           <a:xfrm>
-            <a:off x="457200" y="274680"/>
-            <a:ext cx="8229240" cy="1142640"/>
+            <a:off x="457200" y="273600"/>
+            <a:ext cx="8229240" cy="1144800"/>
           </a:xfrm>
           <a:prstGeom prst="rect">
             <a:avLst/>
@@ -1738,18 +1636,16 @@
             <a:noAutofit/>
           </a:bodyPr>
           <a:p>
-            <a:endParaRPr b="0" lang="ru-RU" sz="4400" spc="-1" strike="noStrike">
-              <a:solidFill>
-                <a:srgbClr val="000000"/>
-              </a:solidFill>
-              <a:latin typeface="Arial"/>
-            </a:endParaRPr>
-          </a:p>
-        </p:txBody>
-      </p:sp>
-      <p:sp>
-        <p:nvSpPr>
-          <p:cNvPr id="71" name="PlaceHolder 2"/>
+            <a:pPr algn="ctr"/>
+            <a:endParaRPr b="0" lang="en-GB" sz="4400" spc="-1" strike="noStrike">
+              <a:latin typeface="Arial"/>
+            </a:endParaRPr>
+          </a:p>
+        </p:txBody>
+      </p:sp>
+      <p:sp>
+        <p:nvSpPr>
+          <p:cNvPr id="65" name="PlaceHolder 2"/>
           <p:cNvSpPr>
             <a:spLocks noGrp="1"/>
           </p:cNvSpPr>
@@ -1759,8 +1655,8 @@
         </p:nvSpPr>
         <p:spPr>
           <a:xfrm>
-            <a:off x="457200" y="1600200"/>
-            <a:ext cx="4015800" cy="2158560"/>
+            <a:off x="457200" y="1604520"/>
+            <a:ext cx="4015800" cy="1896840"/>
           </a:xfrm>
           <a:prstGeom prst="rect">
             <a:avLst/>
@@ -1771,18 +1667,15 @@
             <a:normAutofit/>
           </a:bodyPr>
           <a:p>
-            <a:endParaRPr b="0" lang="ru-RU" sz="3200" spc="-1" strike="noStrike">
-              <a:solidFill>
-                <a:srgbClr val="000000"/>
-              </a:solidFill>
-              <a:latin typeface="Calibri"/>
-            </a:endParaRPr>
-          </a:p>
-        </p:txBody>
-      </p:sp>
-      <p:sp>
-        <p:nvSpPr>
-          <p:cNvPr id="72" name="PlaceHolder 3"/>
+            <a:endParaRPr b="0" lang="en-GB" sz="3200" spc="-1" strike="noStrike">
+              <a:latin typeface="Arial"/>
+            </a:endParaRPr>
+          </a:p>
+        </p:txBody>
+      </p:sp>
+      <p:sp>
+        <p:nvSpPr>
+          <p:cNvPr id="66" name="PlaceHolder 3"/>
           <p:cNvSpPr>
             <a:spLocks noGrp="1"/>
           </p:cNvSpPr>
@@ -1792,8 +1685,8 @@
         </p:nvSpPr>
         <p:spPr>
           <a:xfrm>
-            <a:off x="4674240" y="1600200"/>
-            <a:ext cx="4015800" cy="2158560"/>
+            <a:off x="4674240" y="1604520"/>
+            <a:ext cx="4015800" cy="1896840"/>
           </a:xfrm>
           <a:prstGeom prst="rect">
             <a:avLst/>
@@ -1804,18 +1697,15 @@
             <a:normAutofit/>
           </a:bodyPr>
           <a:p>
-            <a:endParaRPr b="0" lang="ru-RU" sz="3200" spc="-1" strike="noStrike">
-              <a:solidFill>
-                <a:srgbClr val="000000"/>
-              </a:solidFill>
-              <a:latin typeface="Calibri"/>
-            </a:endParaRPr>
-          </a:p>
-        </p:txBody>
-      </p:sp>
-      <p:sp>
-        <p:nvSpPr>
-          <p:cNvPr id="73" name="PlaceHolder 4"/>
+            <a:endParaRPr b="0" lang="en-GB" sz="3200" spc="-1" strike="noStrike">
+              <a:latin typeface="Arial"/>
+            </a:endParaRPr>
+          </a:p>
+        </p:txBody>
+      </p:sp>
+      <p:sp>
+        <p:nvSpPr>
+          <p:cNvPr id="67" name="PlaceHolder 4"/>
           <p:cNvSpPr>
             <a:spLocks noGrp="1"/>
           </p:cNvSpPr>
@@ -1825,8 +1715,8 @@
         </p:nvSpPr>
         <p:spPr>
           <a:xfrm>
-            <a:off x="457200" y="3964320"/>
-            <a:ext cx="4015800" cy="2158560"/>
+            <a:off x="457200" y="3682080"/>
+            <a:ext cx="4015800" cy="1896840"/>
           </a:xfrm>
           <a:prstGeom prst="rect">
             <a:avLst/>
@@ -1837,18 +1727,15 @@
             <a:normAutofit/>
           </a:bodyPr>
           <a:p>
-            <a:endParaRPr b="0" lang="ru-RU" sz="3200" spc="-1" strike="noStrike">
-              <a:solidFill>
-                <a:srgbClr val="000000"/>
-              </a:solidFill>
-              <a:latin typeface="Calibri"/>
-            </a:endParaRPr>
-          </a:p>
-        </p:txBody>
-      </p:sp>
-      <p:sp>
-        <p:nvSpPr>
-          <p:cNvPr id="74" name="PlaceHolder 5"/>
+            <a:endParaRPr b="0" lang="en-GB" sz="3200" spc="-1" strike="noStrike">
+              <a:latin typeface="Arial"/>
+            </a:endParaRPr>
+          </a:p>
+        </p:txBody>
+      </p:sp>
+      <p:sp>
+        <p:nvSpPr>
+          <p:cNvPr id="68" name="PlaceHolder 5"/>
           <p:cNvSpPr>
             <a:spLocks noGrp="1"/>
           </p:cNvSpPr>
@@ -1858,8 +1745,8 @@
         </p:nvSpPr>
         <p:spPr>
           <a:xfrm>
-            <a:off x="4674240" y="3964320"/>
-            <a:ext cx="4015800" cy="2158560"/>
+            <a:off x="4674240" y="3682080"/>
+            <a:ext cx="4015800" cy="1896840"/>
           </a:xfrm>
           <a:prstGeom prst="rect">
             <a:avLst/>
@@ -1870,11 +1757,8 @@
             <a:normAutofit/>
           </a:bodyPr>
           <a:p>
-            <a:endParaRPr b="0" lang="ru-RU" sz="3200" spc="-1" strike="noStrike">
-              <a:solidFill>
-                <a:srgbClr val="000000"/>
-              </a:solidFill>
-              <a:latin typeface="Calibri"/>
+            <a:endParaRPr b="0" lang="en-GB" sz="3200" spc="-1" strike="noStrike">
+              <a:latin typeface="Arial"/>
             </a:endParaRPr>
           </a:p>
         </p:txBody>
@@ -1903,7 +1787,7 @@
       </p:grpSpPr>
       <p:sp>
         <p:nvSpPr>
-          <p:cNvPr id="75" name="PlaceHolder 1"/>
+          <p:cNvPr id="69" name="PlaceHolder 1"/>
           <p:cNvSpPr>
             <a:spLocks noGrp="1"/>
           </p:cNvSpPr>
@@ -1913,8 +1797,8 @@
         </p:nvSpPr>
         <p:spPr>
           <a:xfrm>
-            <a:off x="457200" y="274680"/>
-            <a:ext cx="8229240" cy="1142640"/>
+            <a:off x="457200" y="273600"/>
+            <a:ext cx="8229240" cy="1144800"/>
           </a:xfrm>
           <a:prstGeom prst="rect">
             <a:avLst/>
@@ -1925,18 +1809,16 @@
             <a:noAutofit/>
           </a:bodyPr>
           <a:p>
-            <a:endParaRPr b="0" lang="ru-RU" sz="4400" spc="-1" strike="noStrike">
-              <a:solidFill>
-                <a:srgbClr val="000000"/>
-              </a:solidFill>
-              <a:latin typeface="Arial"/>
-            </a:endParaRPr>
-          </a:p>
-        </p:txBody>
-      </p:sp>
-      <p:sp>
-        <p:nvSpPr>
-          <p:cNvPr id="76" name="PlaceHolder 2"/>
+            <a:pPr algn="ctr"/>
+            <a:endParaRPr b="0" lang="en-GB" sz="4400" spc="-1" strike="noStrike">
+              <a:latin typeface="Arial"/>
+            </a:endParaRPr>
+          </a:p>
+        </p:txBody>
+      </p:sp>
+      <p:sp>
+        <p:nvSpPr>
+          <p:cNvPr id="70" name="PlaceHolder 2"/>
           <p:cNvSpPr>
             <a:spLocks noGrp="1"/>
           </p:cNvSpPr>
@@ -1946,8 +1828,8 @@
         </p:nvSpPr>
         <p:spPr>
           <a:xfrm>
-            <a:off x="457200" y="1600200"/>
-            <a:ext cx="2649600" cy="2158560"/>
+            <a:off x="457200" y="1604520"/>
+            <a:ext cx="2649600" cy="1896840"/>
           </a:xfrm>
           <a:prstGeom prst="rect">
             <a:avLst/>
@@ -1958,18 +1840,15 @@
             <a:normAutofit/>
           </a:bodyPr>
           <a:p>
-            <a:endParaRPr b="0" lang="ru-RU" sz="3200" spc="-1" strike="noStrike">
-              <a:solidFill>
-                <a:srgbClr val="000000"/>
-              </a:solidFill>
-              <a:latin typeface="Calibri"/>
-            </a:endParaRPr>
-          </a:p>
-        </p:txBody>
-      </p:sp>
-      <p:sp>
-        <p:nvSpPr>
-          <p:cNvPr id="77" name="PlaceHolder 3"/>
+            <a:endParaRPr b="0" lang="en-GB" sz="3200" spc="-1" strike="noStrike">
+              <a:latin typeface="Arial"/>
+            </a:endParaRPr>
+          </a:p>
+        </p:txBody>
+      </p:sp>
+      <p:sp>
+        <p:nvSpPr>
+          <p:cNvPr id="71" name="PlaceHolder 3"/>
           <p:cNvSpPr>
             <a:spLocks noGrp="1"/>
           </p:cNvSpPr>
@@ -1979,8 +1858,8 @@
         </p:nvSpPr>
         <p:spPr>
           <a:xfrm>
-            <a:off x="3239640" y="1600200"/>
-            <a:ext cx="2649600" cy="2158560"/>
+            <a:off x="3239640" y="1604520"/>
+            <a:ext cx="2649600" cy="1896840"/>
           </a:xfrm>
           <a:prstGeom prst="rect">
             <a:avLst/>
@@ -1991,18 +1870,15 @@
             <a:normAutofit/>
           </a:bodyPr>
           <a:p>
-            <a:endParaRPr b="0" lang="ru-RU" sz="3200" spc="-1" strike="noStrike">
-              <a:solidFill>
-                <a:srgbClr val="000000"/>
-              </a:solidFill>
-              <a:latin typeface="Calibri"/>
-            </a:endParaRPr>
-          </a:p>
-        </p:txBody>
-      </p:sp>
-      <p:sp>
-        <p:nvSpPr>
-          <p:cNvPr id="78" name="PlaceHolder 4"/>
+            <a:endParaRPr b="0" lang="en-GB" sz="3200" spc="-1" strike="noStrike">
+              <a:latin typeface="Arial"/>
+            </a:endParaRPr>
+          </a:p>
+        </p:txBody>
+      </p:sp>
+      <p:sp>
+        <p:nvSpPr>
+          <p:cNvPr id="72" name="PlaceHolder 4"/>
           <p:cNvSpPr>
             <a:spLocks noGrp="1"/>
           </p:cNvSpPr>
@@ -2012,8 +1888,8 @@
         </p:nvSpPr>
         <p:spPr>
           <a:xfrm>
-            <a:off x="6022080" y="1600200"/>
-            <a:ext cx="2649600" cy="2158560"/>
+            <a:off x="6022080" y="1604520"/>
+            <a:ext cx="2649600" cy="1896840"/>
           </a:xfrm>
           <a:prstGeom prst="rect">
             <a:avLst/>
@@ -2024,18 +1900,15 @@
             <a:normAutofit/>
           </a:bodyPr>
           <a:p>
-            <a:endParaRPr b="0" lang="ru-RU" sz="3200" spc="-1" strike="noStrike">
-              <a:solidFill>
-                <a:srgbClr val="000000"/>
-              </a:solidFill>
-              <a:latin typeface="Calibri"/>
-            </a:endParaRPr>
-          </a:p>
-        </p:txBody>
-      </p:sp>
-      <p:sp>
-        <p:nvSpPr>
-          <p:cNvPr id="79" name="PlaceHolder 5"/>
+            <a:endParaRPr b="0" lang="en-GB" sz="3200" spc="-1" strike="noStrike">
+              <a:latin typeface="Arial"/>
+            </a:endParaRPr>
+          </a:p>
+        </p:txBody>
+      </p:sp>
+      <p:sp>
+        <p:nvSpPr>
+          <p:cNvPr id="73" name="PlaceHolder 5"/>
           <p:cNvSpPr>
             <a:spLocks noGrp="1"/>
           </p:cNvSpPr>
@@ -2045,8 +1918,8 @@
         </p:nvSpPr>
         <p:spPr>
           <a:xfrm>
-            <a:off x="457200" y="3964320"/>
-            <a:ext cx="2649600" cy="2158560"/>
+            <a:off x="457200" y="3682080"/>
+            <a:ext cx="2649600" cy="1896840"/>
           </a:xfrm>
           <a:prstGeom prst="rect">
             <a:avLst/>
@@ -2057,18 +1930,15 @@
             <a:normAutofit/>
           </a:bodyPr>
           <a:p>
-            <a:endParaRPr b="0" lang="ru-RU" sz="3200" spc="-1" strike="noStrike">
-              <a:solidFill>
-                <a:srgbClr val="000000"/>
-              </a:solidFill>
-              <a:latin typeface="Calibri"/>
-            </a:endParaRPr>
-          </a:p>
-        </p:txBody>
-      </p:sp>
-      <p:sp>
-        <p:nvSpPr>
-          <p:cNvPr id="80" name="PlaceHolder 6"/>
+            <a:endParaRPr b="0" lang="en-GB" sz="3200" spc="-1" strike="noStrike">
+              <a:latin typeface="Arial"/>
+            </a:endParaRPr>
+          </a:p>
+        </p:txBody>
+      </p:sp>
+      <p:sp>
+        <p:nvSpPr>
+          <p:cNvPr id="74" name="PlaceHolder 6"/>
           <p:cNvSpPr>
             <a:spLocks noGrp="1"/>
           </p:cNvSpPr>
@@ -2078,8 +1948,8 @@
         </p:nvSpPr>
         <p:spPr>
           <a:xfrm>
-            <a:off x="3239640" y="3964320"/>
-            <a:ext cx="2649600" cy="2158560"/>
+            <a:off x="3239640" y="3682080"/>
+            <a:ext cx="2649600" cy="1896840"/>
           </a:xfrm>
           <a:prstGeom prst="rect">
             <a:avLst/>
@@ -2090,18 +1960,15 @@
             <a:normAutofit/>
           </a:bodyPr>
           <a:p>
-            <a:endParaRPr b="0" lang="ru-RU" sz="3200" spc="-1" strike="noStrike">
-              <a:solidFill>
-                <a:srgbClr val="000000"/>
-              </a:solidFill>
-              <a:latin typeface="Calibri"/>
-            </a:endParaRPr>
-          </a:p>
-        </p:txBody>
-      </p:sp>
-      <p:sp>
-        <p:nvSpPr>
-          <p:cNvPr id="81" name="PlaceHolder 7"/>
+            <a:endParaRPr b="0" lang="en-GB" sz="3200" spc="-1" strike="noStrike">
+              <a:latin typeface="Arial"/>
+            </a:endParaRPr>
+          </a:p>
+        </p:txBody>
+      </p:sp>
+      <p:sp>
+        <p:nvSpPr>
+          <p:cNvPr id="75" name="PlaceHolder 7"/>
           <p:cNvSpPr>
             <a:spLocks noGrp="1"/>
           </p:cNvSpPr>
@@ -2111,8 +1978,8 @@
         </p:nvSpPr>
         <p:spPr>
           <a:xfrm>
-            <a:off x="6022080" y="3964320"/>
-            <a:ext cx="2649600" cy="2158560"/>
+            <a:off x="6022080" y="3682080"/>
+            <a:ext cx="2649600" cy="1896840"/>
           </a:xfrm>
           <a:prstGeom prst="rect">
             <a:avLst/>
@@ -2123,11 +1990,8 @@
             <a:normAutofit/>
           </a:bodyPr>
           <a:p>
-            <a:endParaRPr b="0" lang="ru-RU" sz="3200" spc="-1" strike="noStrike">
-              <a:solidFill>
-                <a:srgbClr val="000000"/>
-              </a:solidFill>
-              <a:latin typeface="Calibri"/>
+            <a:endParaRPr b="0" lang="en-GB" sz="3200" spc="-1" strike="noStrike">
+              <a:latin typeface="Arial"/>
             </a:endParaRPr>
           </a:p>
         </p:txBody>
@@ -2156,7 +2020,7 @@
       </p:grpSpPr>
       <p:sp>
         <p:nvSpPr>
-          <p:cNvPr id="7" name="PlaceHolder 1"/>
+          <p:cNvPr id="4" name="PlaceHolder 1"/>
           <p:cNvSpPr>
             <a:spLocks noGrp="1"/>
           </p:cNvSpPr>
@@ -2166,8 +2030,8 @@
         </p:nvSpPr>
         <p:spPr>
           <a:xfrm>
-            <a:off x="457200" y="274680"/>
-            <a:ext cx="8229240" cy="1142640"/>
+            <a:off x="457200" y="273600"/>
+            <a:ext cx="8229240" cy="1144800"/>
           </a:xfrm>
           <a:prstGeom prst="rect">
             <a:avLst/>
@@ -2178,18 +2042,16 @@
             <a:noAutofit/>
           </a:bodyPr>
           <a:p>
-            <a:endParaRPr b="0" lang="ru-RU" sz="4400" spc="-1" strike="noStrike">
-              <a:solidFill>
-                <a:srgbClr val="000000"/>
-              </a:solidFill>
-              <a:latin typeface="Arial"/>
-            </a:endParaRPr>
-          </a:p>
-        </p:txBody>
-      </p:sp>
-      <p:sp>
-        <p:nvSpPr>
-          <p:cNvPr id="8" name="PlaceHolder 2"/>
+            <a:pPr algn="ctr"/>
+            <a:endParaRPr b="0" lang="en-GB" sz="4400" spc="-1" strike="noStrike">
+              <a:latin typeface="Arial"/>
+            </a:endParaRPr>
+          </a:p>
+        </p:txBody>
+      </p:sp>
+      <p:sp>
+        <p:nvSpPr>
+          <p:cNvPr id="5" name="PlaceHolder 2"/>
           <p:cNvSpPr>
             <a:spLocks noGrp="1"/>
           </p:cNvSpPr>
@@ -2199,8 +2061,8 @@
         </p:nvSpPr>
         <p:spPr>
           <a:xfrm>
-            <a:off x="457200" y="1600200"/>
-            <a:ext cx="8229240" cy="4525560"/>
+            <a:off x="457200" y="1604520"/>
+            <a:ext cx="8229240" cy="3977280"/>
           </a:xfrm>
           <a:prstGeom prst="rect">
             <a:avLst/>
@@ -2211,11 +2073,8 @@
             <a:normAutofit/>
           </a:bodyPr>
           <a:p>
-            <a:endParaRPr b="0" lang="ru-RU" sz="3200" spc="-1" strike="noStrike">
-              <a:solidFill>
-                <a:srgbClr val="000000"/>
-              </a:solidFill>
-              <a:latin typeface="Calibri"/>
+            <a:endParaRPr b="0" lang="en-GB" sz="3200" spc="-1" strike="noStrike">
+              <a:latin typeface="Arial"/>
             </a:endParaRPr>
           </a:p>
         </p:txBody>
@@ -2244,7 +2103,7 @@
       </p:grpSpPr>
       <p:sp>
         <p:nvSpPr>
-          <p:cNvPr id="9" name="PlaceHolder 1"/>
+          <p:cNvPr id="6" name="PlaceHolder 1"/>
           <p:cNvSpPr>
             <a:spLocks noGrp="1"/>
           </p:cNvSpPr>
@@ -2254,8 +2113,8 @@
         </p:nvSpPr>
         <p:spPr>
           <a:xfrm>
-            <a:off x="457200" y="274680"/>
-            <a:ext cx="8229240" cy="1142640"/>
+            <a:off x="457200" y="273600"/>
+            <a:ext cx="8229240" cy="1144800"/>
           </a:xfrm>
           <a:prstGeom prst="rect">
             <a:avLst/>
@@ -2266,18 +2125,16 @@
             <a:noAutofit/>
           </a:bodyPr>
           <a:p>
-            <a:endParaRPr b="0" lang="ru-RU" sz="4400" spc="-1" strike="noStrike">
-              <a:solidFill>
-                <a:srgbClr val="000000"/>
-              </a:solidFill>
-              <a:latin typeface="Arial"/>
-            </a:endParaRPr>
-          </a:p>
-        </p:txBody>
-      </p:sp>
-      <p:sp>
-        <p:nvSpPr>
-          <p:cNvPr id="10" name="PlaceHolder 2"/>
+            <a:pPr algn="ctr"/>
+            <a:endParaRPr b="0" lang="en-GB" sz="4400" spc="-1" strike="noStrike">
+              <a:latin typeface="Arial"/>
+            </a:endParaRPr>
+          </a:p>
+        </p:txBody>
+      </p:sp>
+      <p:sp>
+        <p:nvSpPr>
+          <p:cNvPr id="7" name="PlaceHolder 2"/>
           <p:cNvSpPr>
             <a:spLocks noGrp="1"/>
           </p:cNvSpPr>
@@ -2287,8 +2144,8 @@
         </p:nvSpPr>
         <p:spPr>
           <a:xfrm>
-            <a:off x="457200" y="1600200"/>
-            <a:ext cx="4015800" cy="4525560"/>
+            <a:off x="457200" y="1604520"/>
+            <a:ext cx="4015800" cy="3977280"/>
           </a:xfrm>
           <a:prstGeom prst="rect">
             <a:avLst/>
@@ -2299,18 +2156,15 @@
             <a:normAutofit/>
           </a:bodyPr>
           <a:p>
-            <a:endParaRPr b="0" lang="ru-RU" sz="3200" spc="-1" strike="noStrike">
-              <a:solidFill>
-                <a:srgbClr val="000000"/>
-              </a:solidFill>
-              <a:latin typeface="Calibri"/>
-            </a:endParaRPr>
-          </a:p>
-        </p:txBody>
-      </p:sp>
-      <p:sp>
-        <p:nvSpPr>
-          <p:cNvPr id="11" name="PlaceHolder 3"/>
+            <a:endParaRPr b="0" lang="en-GB" sz="3200" spc="-1" strike="noStrike">
+              <a:latin typeface="Arial"/>
+            </a:endParaRPr>
+          </a:p>
+        </p:txBody>
+      </p:sp>
+      <p:sp>
+        <p:nvSpPr>
+          <p:cNvPr id="8" name="PlaceHolder 3"/>
           <p:cNvSpPr>
             <a:spLocks noGrp="1"/>
           </p:cNvSpPr>
@@ -2320,8 +2174,8 @@
         </p:nvSpPr>
         <p:spPr>
           <a:xfrm>
-            <a:off x="4674240" y="1600200"/>
-            <a:ext cx="4015800" cy="4525560"/>
+            <a:off x="4674240" y="1604520"/>
+            <a:ext cx="4015800" cy="3977280"/>
           </a:xfrm>
           <a:prstGeom prst="rect">
             <a:avLst/>
@@ -2332,11 +2186,8 @@
             <a:normAutofit/>
           </a:bodyPr>
           <a:p>
-            <a:endParaRPr b="0" lang="ru-RU" sz="3200" spc="-1" strike="noStrike">
-              <a:solidFill>
-                <a:srgbClr val="000000"/>
-              </a:solidFill>
-              <a:latin typeface="Calibri"/>
+            <a:endParaRPr b="0" lang="en-GB" sz="3200" spc="-1" strike="noStrike">
+              <a:latin typeface="Arial"/>
             </a:endParaRPr>
           </a:p>
         </p:txBody>
@@ -2365,7 +2216,7 @@
       </p:grpSpPr>
       <p:sp>
         <p:nvSpPr>
-          <p:cNvPr id="12" name="PlaceHolder 1"/>
+          <p:cNvPr id="9" name="PlaceHolder 1"/>
           <p:cNvSpPr>
             <a:spLocks noGrp="1"/>
           </p:cNvSpPr>
@@ -2375,8 +2226,8 @@
         </p:nvSpPr>
         <p:spPr>
           <a:xfrm>
-            <a:off x="457200" y="274680"/>
-            <a:ext cx="8229240" cy="1142640"/>
+            <a:off x="457200" y="273600"/>
+            <a:ext cx="8229240" cy="1144800"/>
           </a:xfrm>
           <a:prstGeom prst="rect">
             <a:avLst/>
@@ -2387,10 +2238,8 @@
             <a:noAutofit/>
           </a:bodyPr>
           <a:p>
-            <a:endParaRPr b="0" lang="ru-RU" sz="4400" spc="-1" strike="noStrike">
-              <a:solidFill>
-                <a:srgbClr val="000000"/>
-              </a:solidFill>
+            <a:pPr algn="ctr"/>
+            <a:endParaRPr b="0" lang="en-GB" sz="4400" spc="-1" strike="noStrike">
               <a:latin typeface="Arial"/>
             </a:endParaRPr>
           </a:p>
@@ -2420,7 +2269,7 @@
       </p:grpSpPr>
       <p:sp>
         <p:nvSpPr>
-          <p:cNvPr id="13" name="PlaceHolder 1"/>
+          <p:cNvPr id="10" name="PlaceHolder 1"/>
           <p:cNvSpPr>
             <a:spLocks noGrp="1"/>
           </p:cNvSpPr>
@@ -2430,8 +2279,8 @@
         </p:nvSpPr>
         <p:spPr>
           <a:xfrm>
-            <a:off x="457200" y="274680"/>
-            <a:ext cx="8229240" cy="5297760"/>
+            <a:off x="457200" y="273600"/>
+            <a:ext cx="8229240" cy="5307840"/>
           </a:xfrm>
           <a:prstGeom prst="rect">
             <a:avLst/>
@@ -2473,7 +2322,7 @@
       </p:grpSpPr>
       <p:sp>
         <p:nvSpPr>
-          <p:cNvPr id="14" name="PlaceHolder 1"/>
+          <p:cNvPr id="11" name="PlaceHolder 1"/>
           <p:cNvSpPr>
             <a:spLocks noGrp="1"/>
           </p:cNvSpPr>
@@ -2483,8 +2332,8 @@
         </p:nvSpPr>
         <p:spPr>
           <a:xfrm>
-            <a:off x="457200" y="274680"/>
-            <a:ext cx="8229240" cy="1142640"/>
+            <a:off x="457200" y="273600"/>
+            <a:ext cx="8229240" cy="1144800"/>
           </a:xfrm>
           <a:prstGeom prst="rect">
             <a:avLst/>
@@ -2495,18 +2344,16 @@
             <a:noAutofit/>
           </a:bodyPr>
           <a:p>
-            <a:endParaRPr b="0" lang="ru-RU" sz="4400" spc="-1" strike="noStrike">
-              <a:solidFill>
-                <a:srgbClr val="000000"/>
-              </a:solidFill>
-              <a:latin typeface="Arial"/>
-            </a:endParaRPr>
-          </a:p>
-        </p:txBody>
-      </p:sp>
-      <p:sp>
-        <p:nvSpPr>
-          <p:cNvPr id="15" name="PlaceHolder 2"/>
+            <a:pPr algn="ctr"/>
+            <a:endParaRPr b="0" lang="en-GB" sz="4400" spc="-1" strike="noStrike">
+              <a:latin typeface="Arial"/>
+            </a:endParaRPr>
+          </a:p>
+        </p:txBody>
+      </p:sp>
+      <p:sp>
+        <p:nvSpPr>
+          <p:cNvPr id="12" name="PlaceHolder 2"/>
           <p:cNvSpPr>
             <a:spLocks noGrp="1"/>
           </p:cNvSpPr>
@@ -2516,8 +2363,8 @@
         </p:nvSpPr>
         <p:spPr>
           <a:xfrm>
-            <a:off x="457200" y="1600200"/>
-            <a:ext cx="4015800" cy="2158560"/>
+            <a:off x="457200" y="1604520"/>
+            <a:ext cx="4015800" cy="1896840"/>
           </a:xfrm>
           <a:prstGeom prst="rect">
             <a:avLst/>
@@ -2528,18 +2375,15 @@
             <a:normAutofit/>
           </a:bodyPr>
           <a:p>
-            <a:endParaRPr b="0" lang="ru-RU" sz="3200" spc="-1" strike="noStrike">
-              <a:solidFill>
-                <a:srgbClr val="000000"/>
-              </a:solidFill>
-              <a:latin typeface="Calibri"/>
-            </a:endParaRPr>
-          </a:p>
-        </p:txBody>
-      </p:sp>
-      <p:sp>
-        <p:nvSpPr>
-          <p:cNvPr id="16" name="PlaceHolder 3"/>
+            <a:endParaRPr b="0" lang="en-GB" sz="3200" spc="-1" strike="noStrike">
+              <a:latin typeface="Arial"/>
+            </a:endParaRPr>
+          </a:p>
+        </p:txBody>
+      </p:sp>
+      <p:sp>
+        <p:nvSpPr>
+          <p:cNvPr id="13" name="PlaceHolder 3"/>
           <p:cNvSpPr>
             <a:spLocks noGrp="1"/>
           </p:cNvSpPr>
@@ -2549,8 +2393,8 @@
         </p:nvSpPr>
         <p:spPr>
           <a:xfrm>
-            <a:off x="4674240" y="1600200"/>
-            <a:ext cx="4015800" cy="4525560"/>
+            <a:off x="4674240" y="1604520"/>
+            <a:ext cx="4015800" cy="3977280"/>
           </a:xfrm>
           <a:prstGeom prst="rect">
             <a:avLst/>
@@ -2561,18 +2405,15 @@
             <a:normAutofit/>
           </a:bodyPr>
           <a:p>
-            <a:endParaRPr b="0" lang="ru-RU" sz="3200" spc="-1" strike="noStrike">
-              <a:solidFill>
-                <a:srgbClr val="000000"/>
-              </a:solidFill>
-              <a:latin typeface="Calibri"/>
-            </a:endParaRPr>
-          </a:p>
-        </p:txBody>
-      </p:sp>
-      <p:sp>
-        <p:nvSpPr>
-          <p:cNvPr id="17" name="PlaceHolder 4"/>
+            <a:endParaRPr b="0" lang="en-GB" sz="3200" spc="-1" strike="noStrike">
+              <a:latin typeface="Arial"/>
+            </a:endParaRPr>
+          </a:p>
+        </p:txBody>
+      </p:sp>
+      <p:sp>
+        <p:nvSpPr>
+          <p:cNvPr id="14" name="PlaceHolder 4"/>
           <p:cNvSpPr>
             <a:spLocks noGrp="1"/>
           </p:cNvSpPr>
@@ -2582,8 +2423,8 @@
         </p:nvSpPr>
         <p:spPr>
           <a:xfrm>
-            <a:off x="457200" y="3964320"/>
-            <a:ext cx="4015800" cy="2158560"/>
+            <a:off x="457200" y="3682080"/>
+            <a:ext cx="4015800" cy="1896840"/>
           </a:xfrm>
           <a:prstGeom prst="rect">
             <a:avLst/>
@@ -2594,11 +2435,8 @@
             <a:normAutofit/>
           </a:bodyPr>
           <a:p>
-            <a:endParaRPr b="0" lang="ru-RU" sz="3200" spc="-1" strike="noStrike">
-              <a:solidFill>
-                <a:srgbClr val="000000"/>
-              </a:solidFill>
-              <a:latin typeface="Calibri"/>
+            <a:endParaRPr b="0" lang="en-GB" sz="3200" spc="-1" strike="noStrike">
+              <a:latin typeface="Arial"/>
             </a:endParaRPr>
           </a:p>
         </p:txBody>
@@ -2627,7 +2465,7 @@
       </p:grpSpPr>
       <p:sp>
         <p:nvSpPr>
-          <p:cNvPr id="18" name="PlaceHolder 1"/>
+          <p:cNvPr id="15" name="PlaceHolder 1"/>
           <p:cNvSpPr>
             <a:spLocks noGrp="1"/>
           </p:cNvSpPr>
@@ -2637,8 +2475,8 @@
         </p:nvSpPr>
         <p:spPr>
           <a:xfrm>
-            <a:off x="457200" y="274680"/>
-            <a:ext cx="8229240" cy="1142640"/>
+            <a:off x="457200" y="273600"/>
+            <a:ext cx="8229240" cy="1144800"/>
           </a:xfrm>
           <a:prstGeom prst="rect">
             <a:avLst/>
@@ -2649,18 +2487,16 @@
             <a:noAutofit/>
           </a:bodyPr>
           <a:p>
-            <a:endParaRPr b="0" lang="ru-RU" sz="4400" spc="-1" strike="noStrike">
-              <a:solidFill>
-                <a:srgbClr val="000000"/>
-              </a:solidFill>
-              <a:latin typeface="Arial"/>
-            </a:endParaRPr>
-          </a:p>
-        </p:txBody>
-      </p:sp>
-      <p:sp>
-        <p:nvSpPr>
-          <p:cNvPr id="19" name="PlaceHolder 2"/>
+            <a:pPr algn="ctr"/>
+            <a:endParaRPr b="0" lang="en-GB" sz="4400" spc="-1" strike="noStrike">
+              <a:latin typeface="Arial"/>
+            </a:endParaRPr>
+          </a:p>
+        </p:txBody>
+      </p:sp>
+      <p:sp>
+        <p:nvSpPr>
+          <p:cNvPr id="16" name="PlaceHolder 2"/>
           <p:cNvSpPr>
             <a:spLocks noGrp="1"/>
           </p:cNvSpPr>
@@ -2670,8 +2506,8 @@
         </p:nvSpPr>
         <p:spPr>
           <a:xfrm>
-            <a:off x="457200" y="1600200"/>
-            <a:ext cx="4015800" cy="4525560"/>
+            <a:off x="457200" y="1604520"/>
+            <a:ext cx="4015800" cy="3977280"/>
           </a:xfrm>
           <a:prstGeom prst="rect">
             <a:avLst/>
@@ -2682,18 +2518,15 @@
             <a:normAutofit/>
           </a:bodyPr>
           <a:p>
-            <a:endParaRPr b="0" lang="ru-RU" sz="3200" spc="-1" strike="noStrike">
-              <a:solidFill>
-                <a:srgbClr val="000000"/>
-              </a:solidFill>
-              <a:latin typeface="Calibri"/>
-            </a:endParaRPr>
-          </a:p>
-        </p:txBody>
-      </p:sp>
-      <p:sp>
-        <p:nvSpPr>
-          <p:cNvPr id="20" name="PlaceHolder 3"/>
+            <a:endParaRPr b="0" lang="en-GB" sz="3200" spc="-1" strike="noStrike">
+              <a:latin typeface="Arial"/>
+            </a:endParaRPr>
+          </a:p>
+        </p:txBody>
+      </p:sp>
+      <p:sp>
+        <p:nvSpPr>
+          <p:cNvPr id="17" name="PlaceHolder 3"/>
           <p:cNvSpPr>
             <a:spLocks noGrp="1"/>
           </p:cNvSpPr>
@@ -2703,8 +2536,8 @@
         </p:nvSpPr>
         <p:spPr>
           <a:xfrm>
-            <a:off x="4674240" y="1600200"/>
-            <a:ext cx="4015800" cy="2158560"/>
+            <a:off x="4674240" y="1604520"/>
+            <a:ext cx="4015800" cy="1896840"/>
           </a:xfrm>
           <a:prstGeom prst="rect">
             <a:avLst/>
@@ -2715,18 +2548,15 @@
             <a:normAutofit/>
           </a:bodyPr>
           <a:p>
-            <a:endParaRPr b="0" lang="ru-RU" sz="3200" spc="-1" strike="noStrike">
-              <a:solidFill>
-                <a:srgbClr val="000000"/>
-              </a:solidFill>
-              <a:latin typeface="Calibri"/>
-            </a:endParaRPr>
-          </a:p>
-        </p:txBody>
-      </p:sp>
-      <p:sp>
-        <p:nvSpPr>
-          <p:cNvPr id="21" name="PlaceHolder 4"/>
+            <a:endParaRPr b="0" lang="en-GB" sz="3200" spc="-1" strike="noStrike">
+              <a:latin typeface="Arial"/>
+            </a:endParaRPr>
+          </a:p>
+        </p:txBody>
+      </p:sp>
+      <p:sp>
+        <p:nvSpPr>
+          <p:cNvPr id="18" name="PlaceHolder 4"/>
           <p:cNvSpPr>
             <a:spLocks noGrp="1"/>
           </p:cNvSpPr>
@@ -2736,8 +2566,8 @@
         </p:nvSpPr>
         <p:spPr>
           <a:xfrm>
-            <a:off x="4674240" y="3964320"/>
-            <a:ext cx="4015800" cy="2158560"/>
+            <a:off x="4674240" y="3682080"/>
+            <a:ext cx="4015800" cy="1896840"/>
           </a:xfrm>
           <a:prstGeom prst="rect">
             <a:avLst/>
@@ -2748,11 +2578,8 @@
             <a:normAutofit/>
           </a:bodyPr>
           <a:p>
-            <a:endParaRPr b="0" lang="ru-RU" sz="3200" spc="-1" strike="noStrike">
-              <a:solidFill>
-                <a:srgbClr val="000000"/>
-              </a:solidFill>
-              <a:latin typeface="Calibri"/>
+            <a:endParaRPr b="0" lang="en-GB" sz="3200" spc="-1" strike="noStrike">
+              <a:latin typeface="Arial"/>
             </a:endParaRPr>
           </a:p>
         </p:txBody>
@@ -2781,7 +2608,7 @@
       </p:grpSpPr>
       <p:sp>
         <p:nvSpPr>
-          <p:cNvPr id="22" name="PlaceHolder 1"/>
+          <p:cNvPr id="19" name="PlaceHolder 1"/>
           <p:cNvSpPr>
             <a:spLocks noGrp="1"/>
           </p:cNvSpPr>
@@ -2791,8 +2618,8 @@
         </p:nvSpPr>
         <p:spPr>
           <a:xfrm>
-            <a:off x="457200" y="274680"/>
-            <a:ext cx="8229240" cy="1142640"/>
+            <a:off x="457200" y="273600"/>
+            <a:ext cx="8229240" cy="1144800"/>
           </a:xfrm>
           <a:prstGeom prst="rect">
             <a:avLst/>
@@ -2803,18 +2630,16 @@
             <a:noAutofit/>
           </a:bodyPr>
           <a:p>
-            <a:endParaRPr b="0" lang="ru-RU" sz="4400" spc="-1" strike="noStrike">
-              <a:solidFill>
-                <a:srgbClr val="000000"/>
-              </a:solidFill>
-              <a:latin typeface="Arial"/>
-            </a:endParaRPr>
-          </a:p>
-        </p:txBody>
-      </p:sp>
-      <p:sp>
-        <p:nvSpPr>
-          <p:cNvPr id="23" name="PlaceHolder 2"/>
+            <a:pPr algn="ctr"/>
+            <a:endParaRPr b="0" lang="en-GB" sz="4400" spc="-1" strike="noStrike">
+              <a:latin typeface="Arial"/>
+            </a:endParaRPr>
+          </a:p>
+        </p:txBody>
+      </p:sp>
+      <p:sp>
+        <p:nvSpPr>
+          <p:cNvPr id="20" name="PlaceHolder 2"/>
           <p:cNvSpPr>
             <a:spLocks noGrp="1"/>
           </p:cNvSpPr>
@@ -2824,8 +2649,8 @@
         </p:nvSpPr>
         <p:spPr>
           <a:xfrm>
-            <a:off x="457200" y="1600200"/>
-            <a:ext cx="4015800" cy="2158560"/>
+            <a:off x="457200" y="1604520"/>
+            <a:ext cx="4015800" cy="1896840"/>
           </a:xfrm>
           <a:prstGeom prst="rect">
             <a:avLst/>
@@ -2836,18 +2661,15 @@
             <a:normAutofit/>
           </a:bodyPr>
           <a:p>
-            <a:endParaRPr b="0" lang="ru-RU" sz="3200" spc="-1" strike="noStrike">
-              <a:solidFill>
-                <a:srgbClr val="000000"/>
-              </a:solidFill>
-              <a:latin typeface="Calibri"/>
-            </a:endParaRPr>
-          </a:p>
-        </p:txBody>
-      </p:sp>
-      <p:sp>
-        <p:nvSpPr>
-          <p:cNvPr id="24" name="PlaceHolder 3"/>
+            <a:endParaRPr b="0" lang="en-GB" sz="3200" spc="-1" strike="noStrike">
+              <a:latin typeface="Arial"/>
+            </a:endParaRPr>
+          </a:p>
+        </p:txBody>
+      </p:sp>
+      <p:sp>
+        <p:nvSpPr>
+          <p:cNvPr id="21" name="PlaceHolder 3"/>
           <p:cNvSpPr>
             <a:spLocks noGrp="1"/>
           </p:cNvSpPr>
@@ -2857,8 +2679,8 @@
         </p:nvSpPr>
         <p:spPr>
           <a:xfrm>
-            <a:off x="4674240" y="1600200"/>
-            <a:ext cx="4015800" cy="2158560"/>
+            <a:off x="4674240" y="1604520"/>
+            <a:ext cx="4015800" cy="1896840"/>
           </a:xfrm>
           <a:prstGeom prst="rect">
             <a:avLst/>
@@ -2869,18 +2691,15 @@
             <a:normAutofit/>
           </a:bodyPr>
           <a:p>
-            <a:endParaRPr b="0" lang="ru-RU" sz="3200" spc="-1" strike="noStrike">
-              <a:solidFill>
-                <a:srgbClr val="000000"/>
-              </a:solidFill>
-              <a:latin typeface="Calibri"/>
-            </a:endParaRPr>
-          </a:p>
-        </p:txBody>
-      </p:sp>
-      <p:sp>
-        <p:nvSpPr>
-          <p:cNvPr id="25" name="PlaceHolder 4"/>
+            <a:endParaRPr b="0" lang="en-GB" sz="3200" spc="-1" strike="noStrike">
+              <a:latin typeface="Arial"/>
+            </a:endParaRPr>
+          </a:p>
+        </p:txBody>
+      </p:sp>
+      <p:sp>
+        <p:nvSpPr>
+          <p:cNvPr id="22" name="PlaceHolder 4"/>
           <p:cNvSpPr>
             <a:spLocks noGrp="1"/>
           </p:cNvSpPr>
@@ -2890,8 +2709,8 @@
         </p:nvSpPr>
         <p:spPr>
           <a:xfrm>
-            <a:off x="457200" y="3964320"/>
-            <a:ext cx="8229240" cy="2158560"/>
+            <a:off x="457200" y="3682080"/>
+            <a:ext cx="8229240" cy="1896840"/>
           </a:xfrm>
           <a:prstGeom prst="rect">
             <a:avLst/>
@@ -2902,11 +2721,8 @@
             <a:normAutofit/>
           </a:bodyPr>
           <a:p>
-            <a:endParaRPr b="0" lang="ru-RU" sz="3200" spc="-1" strike="noStrike">
-              <a:solidFill>
-                <a:srgbClr val="000000"/>
-              </a:solidFill>
-              <a:latin typeface="Calibri"/>
+            <a:endParaRPr b="0" lang="en-GB" sz="3200" spc="-1" strike="noStrike">
+              <a:latin typeface="Arial"/>
             </a:endParaRPr>
           </a:p>
         </p:txBody>
@@ -2955,36 +2771,25 @@
         </p:nvSpPr>
         <p:spPr>
           <a:xfrm>
-            <a:off x="685800" y="2130480"/>
-            <a:ext cx="7772040" cy="1469520"/>
-          </a:xfrm>
-          <a:prstGeom prst="rect">
-            <a:avLst/>
-          </a:prstGeom>
-        </p:spPr>
-        <p:txBody>
-          <a:bodyPr anchor="ctr">
+            <a:off x="457200" y="274680"/>
+            <a:ext cx="8228880" cy="1142280"/>
+          </a:xfrm>
+          <a:prstGeom prst="rect">
+            <a:avLst/>
+          </a:prstGeom>
+        </p:spPr>
+        <p:txBody>
+          <a:bodyPr lIns="0" rIns="0" tIns="0" bIns="0" anchor="ctr">
             <a:noAutofit/>
           </a:bodyPr>
           <a:p>
-            <a:pPr algn="ctr">
-              <a:lnSpc>
-                <a:spcPct val="100000"/>
-              </a:lnSpc>
-            </a:pPr>
             <a:r>
-              <a:rPr b="0" lang="ru-RU" sz="4400" spc="-1" strike="noStrike">
-                <a:solidFill>
-                  <a:srgbClr val="000000"/>
-                </a:solidFill>
-                <a:latin typeface="Calibri"/>
+              <a:rPr b="0" lang="en-GB" sz="1800" spc="-1" strike="noStrike">
+                <a:latin typeface="Arial"/>
               </a:rPr>
-              <a:t>Образец заголовка</a:t>
+              <a:t>Click to edit the title text format</a:t>
             </a:r>
-            <a:endParaRPr b="0" lang="ru-RU" sz="4400" spc="-1" strike="noStrike">
-              <a:solidFill>
-                <a:srgbClr val="000000"/>
-              </a:solidFill>
+            <a:endParaRPr b="0" lang="en-GB" sz="1800" spc="-1" strike="noStrike">
               <a:latin typeface="Arial"/>
             </a:endParaRPr>
           </a:p>
@@ -2993,124 +2798,6 @@
       <p:sp>
         <p:nvSpPr>
           <p:cNvPr id="1" name="PlaceHolder 2"/>
-          <p:cNvSpPr>
-            <a:spLocks noGrp="1"/>
-          </p:cNvSpPr>
-          <p:nvPr>
-            <p:ph type="dt"/>
-          </p:nvPr>
-        </p:nvSpPr>
-        <p:spPr>
-          <a:xfrm>
-            <a:off x="457200" y="6356520"/>
-            <a:ext cx="2133360" cy="364680"/>
-          </a:xfrm>
-          <a:prstGeom prst="rect">
-            <a:avLst/>
-          </a:prstGeom>
-        </p:spPr>
-        <p:txBody>
-          <a:bodyPr anchor="ctr">
-            <a:noAutofit/>
-          </a:bodyPr>
-          <a:p>
-            <a:pPr>
-              <a:lnSpc>
-                <a:spcPct val="100000"/>
-              </a:lnSpc>
-            </a:pPr>
-            <a:fld id="{AE7A95CF-99A7-43D1-BBB4-EEBA36B64E93}" type="datetime">
-              <a:rPr b="0" lang="ru-RU" sz="1200" spc="-1" strike="noStrike">
-                <a:solidFill>
-                  <a:srgbClr val="8b8b8b"/>
-                </a:solidFill>
-                <a:latin typeface="Calibri"/>
-              </a:rPr>
-              <a:t>8.11.21</a:t>
-            </a:fld>
-            <a:endParaRPr b="0" lang="en-GB" sz="1200" spc="-1" strike="noStrike">
-              <a:latin typeface="Times New Roman"/>
-            </a:endParaRPr>
-          </a:p>
-        </p:txBody>
-      </p:sp>
-      <p:sp>
-        <p:nvSpPr>
-          <p:cNvPr id="2" name="PlaceHolder 3"/>
-          <p:cNvSpPr>
-            <a:spLocks noGrp="1"/>
-          </p:cNvSpPr>
-          <p:nvPr>
-            <p:ph type="ftr"/>
-          </p:nvPr>
-        </p:nvSpPr>
-        <p:spPr>
-          <a:xfrm>
-            <a:off x="3124080" y="6356520"/>
-            <a:ext cx="2895120" cy="364680"/>
-          </a:xfrm>
-          <a:prstGeom prst="rect">
-            <a:avLst/>
-          </a:prstGeom>
-        </p:spPr>
-        <p:txBody>
-          <a:bodyPr anchor="ctr">
-            <a:noAutofit/>
-          </a:bodyPr>
-          <a:p>
-            <a:endParaRPr b="0" lang="en-GB" sz="2400" spc="-1" strike="noStrike">
-              <a:latin typeface="Times New Roman"/>
-            </a:endParaRPr>
-          </a:p>
-        </p:txBody>
-      </p:sp>
-      <p:sp>
-        <p:nvSpPr>
-          <p:cNvPr id="3" name="PlaceHolder 4"/>
-          <p:cNvSpPr>
-            <a:spLocks noGrp="1"/>
-          </p:cNvSpPr>
-          <p:nvPr>
-            <p:ph type="sldNum"/>
-          </p:nvPr>
-        </p:nvSpPr>
-        <p:spPr>
-          <a:xfrm>
-            <a:off x="6553080" y="6356520"/>
-            <a:ext cx="2133360" cy="364680"/>
-          </a:xfrm>
-          <a:prstGeom prst="rect">
-            <a:avLst/>
-          </a:prstGeom>
-        </p:spPr>
-        <p:txBody>
-          <a:bodyPr anchor="ctr">
-            <a:noAutofit/>
-          </a:bodyPr>
-          <a:p>
-            <a:pPr algn="r">
-              <a:lnSpc>
-                <a:spcPct val="100000"/>
-              </a:lnSpc>
-            </a:pPr>
-            <a:fld id="{D9732417-108A-445E-926B-77E3EE581065}" type="slidenum">
-              <a:rPr b="0" lang="ru-RU" sz="1200" spc="-1" strike="noStrike">
-                <a:solidFill>
-                  <a:srgbClr val="8b8b8b"/>
-                </a:solidFill>
-                <a:latin typeface="Calibri"/>
-              </a:rPr>
-              <a:t>&lt;number&gt;</a:t>
-            </a:fld>
-            <a:endParaRPr b="0" lang="en-GB" sz="1200" spc="-1" strike="noStrike">
-              <a:latin typeface="Times New Roman"/>
-            </a:endParaRPr>
-          </a:p>
-        </p:txBody>
-      </p:sp>
-      <p:sp>
-        <p:nvSpPr>
-          <p:cNvPr id="4" name="PlaceHolder 5"/>
           <p:cNvSpPr>
             <a:spLocks noGrp="1"/>
           </p:cNvSpPr>
@@ -3144,19 +2831,13 @@
               <a:buChar char=""/>
             </a:pPr>
             <a:r>
-              <a:rPr b="0" lang="ru-RU" sz="3200" spc="-1" strike="noStrike">
-                <a:solidFill>
-                  <a:srgbClr val="000000"/>
-                </a:solidFill>
-                <a:latin typeface="Calibri"/>
+              <a:rPr b="0" lang="en-GB" sz="3200" spc="-1" strike="noStrike">
+                <a:latin typeface="Arial"/>
               </a:rPr>
               <a:t>Click to edit the outline text format</a:t>
             </a:r>
-            <a:endParaRPr b="0" lang="ru-RU" sz="3200" spc="-1" strike="noStrike">
-              <a:solidFill>
-                <a:srgbClr val="000000"/>
-              </a:solidFill>
-              <a:latin typeface="Calibri"/>
+            <a:endParaRPr b="0" lang="en-GB" sz="3200" spc="-1" strike="noStrike">
+              <a:latin typeface="Arial"/>
             </a:endParaRPr>
           </a:p>
           <a:p>
@@ -3172,19 +2853,13 @@
               <a:buChar char=""/>
             </a:pPr>
             <a:r>
-              <a:rPr b="0" lang="ru-RU" sz="2400" spc="-1" strike="noStrike">
-                <a:solidFill>
-                  <a:srgbClr val="000000"/>
-                </a:solidFill>
-                <a:latin typeface="Calibri"/>
+              <a:rPr b="0" lang="en-GB" sz="2800" spc="-1" strike="noStrike">
+                <a:latin typeface="Arial"/>
               </a:rPr>
               <a:t>Second Outline Level</a:t>
             </a:r>
-            <a:endParaRPr b="0" lang="ru-RU" sz="2400" spc="-1" strike="noStrike">
-              <a:solidFill>
-                <a:srgbClr val="000000"/>
-              </a:solidFill>
-              <a:latin typeface="Calibri"/>
+            <a:endParaRPr b="0" lang="en-GB" sz="2800" spc="-1" strike="noStrike">
+              <a:latin typeface="Arial"/>
             </a:endParaRPr>
           </a:p>
           <a:p>
@@ -3200,19 +2875,13 @@
               <a:buChar char=""/>
             </a:pPr>
             <a:r>
-              <a:rPr b="0" lang="ru-RU" sz="2000" spc="-1" strike="noStrike">
-                <a:solidFill>
-                  <a:srgbClr val="000000"/>
-                </a:solidFill>
-                <a:latin typeface="Calibri"/>
+              <a:rPr b="0" lang="en-GB" sz="2400" spc="-1" strike="noStrike">
+                <a:latin typeface="Arial"/>
               </a:rPr>
               <a:t>Third Outline Level</a:t>
             </a:r>
-            <a:endParaRPr b="0" lang="ru-RU" sz="2000" spc="-1" strike="noStrike">
-              <a:solidFill>
-                <a:srgbClr val="000000"/>
-              </a:solidFill>
-              <a:latin typeface="Calibri"/>
+            <a:endParaRPr b="0" lang="en-GB" sz="2400" spc="-1" strike="noStrike">
+              <a:latin typeface="Arial"/>
             </a:endParaRPr>
           </a:p>
           <a:p>
@@ -3228,19 +2897,13 @@
               <a:buChar char=""/>
             </a:pPr>
             <a:r>
-              <a:rPr b="0" lang="ru-RU" sz="2000" spc="-1" strike="noStrike">
-                <a:solidFill>
-                  <a:srgbClr val="000000"/>
-                </a:solidFill>
-                <a:latin typeface="Calibri"/>
+              <a:rPr b="0" lang="en-GB" sz="2000" spc="-1" strike="noStrike">
+                <a:latin typeface="Arial"/>
               </a:rPr>
               <a:t>Fourth Outline Level</a:t>
             </a:r>
-            <a:endParaRPr b="0" lang="ru-RU" sz="2000" spc="-1" strike="noStrike">
-              <a:solidFill>
-                <a:srgbClr val="000000"/>
-              </a:solidFill>
-              <a:latin typeface="Calibri"/>
+            <a:endParaRPr b="0" lang="en-GB" sz="2000" spc="-1" strike="noStrike">
+              <a:latin typeface="Arial"/>
             </a:endParaRPr>
           </a:p>
           <a:p>
@@ -3256,19 +2919,13 @@
               <a:buChar char=""/>
             </a:pPr>
             <a:r>
-              <a:rPr b="0" lang="ru-RU" sz="2000" spc="-1" strike="noStrike">
-                <a:solidFill>
-                  <a:srgbClr val="000000"/>
-                </a:solidFill>
-                <a:latin typeface="Calibri"/>
+              <a:rPr b="0" lang="en-GB" sz="2000" spc="-1" strike="noStrike">
+                <a:latin typeface="Arial"/>
               </a:rPr>
               <a:t>Fifth Outline Level</a:t>
             </a:r>
-            <a:endParaRPr b="0" lang="ru-RU" sz="2000" spc="-1" strike="noStrike">
-              <a:solidFill>
-                <a:srgbClr val="000000"/>
-              </a:solidFill>
-              <a:latin typeface="Calibri"/>
+            <a:endParaRPr b="0" lang="en-GB" sz="2000" spc="-1" strike="noStrike">
+              <a:latin typeface="Arial"/>
             </a:endParaRPr>
           </a:p>
           <a:p>
@@ -3284,19 +2941,13 @@
               <a:buChar char=""/>
             </a:pPr>
             <a:r>
-              <a:rPr b="0" lang="ru-RU" sz="2000" spc="-1" strike="noStrike">
-                <a:solidFill>
-                  <a:srgbClr val="000000"/>
-                </a:solidFill>
-                <a:latin typeface="Calibri"/>
+              <a:rPr b="0" lang="en-GB" sz="2000" spc="-1" strike="noStrike">
+                <a:latin typeface="Arial"/>
               </a:rPr>
               <a:t>Sixth Outline Level</a:t>
             </a:r>
-            <a:endParaRPr b="0" lang="ru-RU" sz="2000" spc="-1" strike="noStrike">
-              <a:solidFill>
-                <a:srgbClr val="000000"/>
-              </a:solidFill>
-              <a:latin typeface="Calibri"/>
+            <a:endParaRPr b="0" lang="en-GB" sz="2000" spc="-1" strike="noStrike">
+              <a:latin typeface="Arial"/>
             </a:endParaRPr>
           </a:p>
           <a:p>
@@ -3312,19 +2963,13 @@
               <a:buChar char=""/>
             </a:pPr>
             <a:r>
-              <a:rPr b="0" lang="ru-RU" sz="2000" spc="-1" strike="noStrike">
-                <a:solidFill>
-                  <a:srgbClr val="000000"/>
-                </a:solidFill>
-                <a:latin typeface="Calibri"/>
+              <a:rPr b="0" lang="en-GB" sz="2000" spc="-1" strike="noStrike">
+                <a:latin typeface="Arial"/>
               </a:rPr>
               <a:t>Seventh Outline Level</a:t>
             </a:r>
-            <a:endParaRPr b="0" lang="ru-RU" sz="2000" spc="-1" strike="noStrike">
-              <a:solidFill>
-                <a:srgbClr val="000000"/>
-              </a:solidFill>
-              <a:latin typeface="Calibri"/>
+            <a:endParaRPr b="0" lang="en-GB" sz="2000" spc="-1" strike="noStrike">
+              <a:latin typeface="Arial"/>
             </a:endParaRPr>
           </a:p>
         </p:txBody>
@@ -3378,7 +3023,7 @@
       </p:grpSpPr>
       <p:sp>
         <p:nvSpPr>
-          <p:cNvPr id="41" name="PlaceHolder 1"/>
+          <p:cNvPr id="38" name="PlaceHolder 1"/>
           <p:cNvSpPr>
             <a:spLocks noGrp="1"/>
           </p:cNvSpPr>
@@ -3388,44 +3033,34 @@
         </p:nvSpPr>
         <p:spPr>
           <a:xfrm>
-            <a:off x="457200" y="274680"/>
-            <a:ext cx="8229240" cy="1142640"/>
-          </a:xfrm>
-          <a:prstGeom prst="rect">
-            <a:avLst/>
-          </a:prstGeom>
-        </p:spPr>
-        <p:txBody>
-          <a:bodyPr anchor="ctr">
+            <a:off x="457200" y="273600"/>
+            <a:ext cx="8229240" cy="1144800"/>
+          </a:xfrm>
+          <a:prstGeom prst="rect">
+            <a:avLst/>
+          </a:prstGeom>
+        </p:spPr>
+        <p:txBody>
+          <a:bodyPr lIns="0" rIns="0" tIns="0" bIns="0" anchor="ctr">
             <a:noAutofit/>
           </a:bodyPr>
           <a:p>
-            <a:pPr algn="ctr">
-              <a:lnSpc>
-                <a:spcPct val="100000"/>
-              </a:lnSpc>
-            </a:pPr>
+            <a:pPr algn="ctr"/>
             <a:r>
-              <a:rPr b="0" lang="ru-RU" sz="4400" spc="-1" strike="noStrike">
-                <a:solidFill>
-                  <a:srgbClr val="000000"/>
-                </a:solidFill>
-                <a:latin typeface="Calibri"/>
+              <a:rPr b="0" lang="en-GB" sz="4400" spc="-1" strike="noStrike">
+                <a:latin typeface="Arial"/>
               </a:rPr>
-              <a:t>Образец заголовка</a:t>
+              <a:t>Click to edit the title text format</a:t>
             </a:r>
-            <a:endParaRPr b="0" lang="ru-RU" sz="4400" spc="-1" strike="noStrike">
-              <a:solidFill>
-                <a:srgbClr val="000000"/>
-              </a:solidFill>
-              <a:latin typeface="Arial"/>
-            </a:endParaRPr>
-          </a:p>
-        </p:txBody>
-      </p:sp>
-      <p:sp>
-        <p:nvSpPr>
-          <p:cNvPr id="42" name="PlaceHolder 2"/>
+            <a:endParaRPr b="0" lang="en-GB" sz="4400" spc="-1" strike="noStrike">
+              <a:latin typeface="Arial"/>
+            </a:endParaRPr>
+          </a:p>
+        </p:txBody>
+      </p:sp>
+      <p:sp>
+        <p:nvSpPr>
+          <p:cNvPr id="39" name="PlaceHolder 2"/>
           <p:cNvSpPr>
             <a:spLocks noGrp="1"/>
           </p:cNvSpPr>
@@ -3435,283 +3070,169 @@
         </p:nvSpPr>
         <p:spPr>
           <a:xfrm>
-            <a:off x="457200" y="1600200"/>
-            <a:ext cx="8229240" cy="4525560"/>
-          </a:xfrm>
-          <a:prstGeom prst="rect">
-            <a:avLst/>
-          </a:prstGeom>
-        </p:spPr>
-        <p:txBody>
-          <a:bodyPr>
-            <a:noAutofit/>
-          </a:bodyPr>
-          <a:p>
-            <a:pPr marL="343080" indent="-342720">
-              <a:lnSpc>
-                <a:spcPct val="100000"/>
-              </a:lnSpc>
+            <a:off x="457200" y="1604520"/>
+            <a:ext cx="8229240" cy="3977280"/>
+          </a:xfrm>
+          <a:prstGeom prst="rect">
+            <a:avLst/>
+          </a:prstGeom>
+        </p:spPr>
+        <p:txBody>
+          <a:bodyPr lIns="0" rIns="0" tIns="0" bIns="0">
+            <a:normAutofit/>
+          </a:bodyPr>
+          <a:p>
+            <a:pPr marL="432000" indent="-324000">
               <a:spcBef>
-                <a:spcPts val="641"/>
+                <a:spcPts val="1417"/>
               </a:spcBef>
               <a:buClr>
                 <a:srgbClr val="000000"/>
               </a:buClr>
-              <a:buFont typeface="Arial"/>
-              <a:buChar char="•"/>
+              <a:buSzPct val="45000"/>
+              <a:buFont typeface="Wingdings" charset="2"/>
+              <a:buChar char=""/>
             </a:pPr>
             <a:r>
-              <a:rPr b="0" lang="ru-RU" sz="3200" spc="-1" strike="noStrike">
-                <a:solidFill>
-                  <a:srgbClr val="000000"/>
-                </a:solidFill>
-                <a:latin typeface="Calibri"/>
+              <a:rPr b="0" lang="en-GB" sz="3200" spc="-1" strike="noStrike">
+                <a:latin typeface="Arial"/>
               </a:rPr>
-              <a:t>Образец текста</a:t>
+              <a:t>Click to edit the outline text format</a:t>
             </a:r>
-            <a:endParaRPr b="0" lang="ru-RU" sz="3200" spc="-1" strike="noStrike">
-              <a:solidFill>
-                <a:srgbClr val="000000"/>
-              </a:solidFill>
-              <a:latin typeface="Calibri"/>
-            </a:endParaRPr>
-          </a:p>
-          <a:p>
-            <a:pPr lvl="1" marL="743040" indent="-285480">
-              <a:lnSpc>
-                <a:spcPct val="100000"/>
-              </a:lnSpc>
+            <a:endParaRPr b="0" lang="en-GB" sz="3200" spc="-1" strike="noStrike">
+              <a:latin typeface="Arial"/>
+            </a:endParaRPr>
+          </a:p>
+          <a:p>
+            <a:pPr lvl="1" marL="864000" indent="-324000">
               <a:spcBef>
-                <a:spcPts val="561"/>
+                <a:spcPts val="1134"/>
               </a:spcBef>
               <a:buClr>
                 <a:srgbClr val="000000"/>
               </a:buClr>
-              <a:buFont typeface="Arial"/>
-              <a:buChar char="–"/>
+              <a:buSzPct val="75000"/>
+              <a:buFont typeface="Symbol" charset="2"/>
+              <a:buChar char=""/>
             </a:pPr>
             <a:r>
-              <a:rPr b="0" lang="ru-RU" sz="2800" spc="-1" strike="noStrike">
-                <a:solidFill>
-                  <a:srgbClr val="000000"/>
-                </a:solidFill>
-                <a:latin typeface="Calibri"/>
+              <a:rPr b="0" lang="en-GB" sz="2800" spc="-1" strike="noStrike">
+                <a:latin typeface="Arial"/>
               </a:rPr>
-              <a:t>Второй уровень</a:t>
+              <a:t>Second Outline Level</a:t>
             </a:r>
-            <a:endParaRPr b="0" lang="ru-RU" sz="2800" spc="-1" strike="noStrike">
-              <a:solidFill>
-                <a:srgbClr val="000000"/>
-              </a:solidFill>
-              <a:latin typeface="Calibri"/>
-            </a:endParaRPr>
-          </a:p>
-          <a:p>
-            <a:pPr lvl="2" marL="1143000" indent="-228240">
-              <a:lnSpc>
-                <a:spcPct val="100000"/>
-              </a:lnSpc>
+            <a:endParaRPr b="0" lang="en-GB" sz="2800" spc="-1" strike="noStrike">
+              <a:latin typeface="Arial"/>
+            </a:endParaRPr>
+          </a:p>
+          <a:p>
+            <a:pPr lvl="2" marL="1296000" indent="-288000">
               <a:spcBef>
-                <a:spcPts val="479"/>
+                <a:spcPts val="850"/>
               </a:spcBef>
               <a:buClr>
                 <a:srgbClr val="000000"/>
               </a:buClr>
-              <a:buFont typeface="Arial"/>
-              <a:buChar char="•"/>
+              <a:buSzPct val="45000"/>
+              <a:buFont typeface="Wingdings" charset="2"/>
+              <a:buChar char=""/>
             </a:pPr>
             <a:r>
-              <a:rPr b="0" lang="ru-RU" sz="2400" spc="-1" strike="noStrike">
-                <a:solidFill>
-                  <a:srgbClr val="000000"/>
-                </a:solidFill>
-                <a:latin typeface="Calibri"/>
+              <a:rPr b="0" lang="en-GB" sz="2400" spc="-1" strike="noStrike">
+                <a:latin typeface="Arial"/>
               </a:rPr>
-              <a:t>Третий уровень</a:t>
+              <a:t>Third Outline Level</a:t>
             </a:r>
-            <a:endParaRPr b="0" lang="ru-RU" sz="2400" spc="-1" strike="noStrike">
-              <a:solidFill>
-                <a:srgbClr val="000000"/>
-              </a:solidFill>
-              <a:latin typeface="Calibri"/>
-            </a:endParaRPr>
-          </a:p>
-          <a:p>
-            <a:pPr lvl="3" marL="1600200" indent="-228240">
-              <a:lnSpc>
-                <a:spcPct val="100000"/>
-              </a:lnSpc>
+            <a:endParaRPr b="0" lang="en-GB" sz="2400" spc="-1" strike="noStrike">
+              <a:latin typeface="Arial"/>
+            </a:endParaRPr>
+          </a:p>
+          <a:p>
+            <a:pPr lvl="3" marL="1728000" indent="-216000">
               <a:spcBef>
-                <a:spcPts val="400"/>
+                <a:spcPts val="567"/>
               </a:spcBef>
               <a:buClr>
                 <a:srgbClr val="000000"/>
               </a:buClr>
-              <a:buFont typeface="Arial"/>
-              <a:buChar char="–"/>
+              <a:buSzPct val="75000"/>
+              <a:buFont typeface="Symbol" charset="2"/>
+              <a:buChar char=""/>
             </a:pPr>
             <a:r>
-              <a:rPr b="0" lang="ru-RU" sz="2000" spc="-1" strike="noStrike">
-                <a:solidFill>
-                  <a:srgbClr val="000000"/>
-                </a:solidFill>
-                <a:latin typeface="Calibri"/>
+              <a:rPr b="0" lang="en-GB" sz="2000" spc="-1" strike="noStrike">
+                <a:latin typeface="Arial"/>
               </a:rPr>
-              <a:t>Четвертый уровень</a:t>
+              <a:t>Fourth Outline Level</a:t>
             </a:r>
-            <a:endParaRPr b="0" lang="ru-RU" sz="2000" spc="-1" strike="noStrike">
-              <a:solidFill>
-                <a:srgbClr val="000000"/>
-              </a:solidFill>
-              <a:latin typeface="Calibri"/>
-            </a:endParaRPr>
-          </a:p>
-          <a:p>
-            <a:pPr lvl="4" marL="2057400" indent="-228240">
-              <a:lnSpc>
-                <a:spcPct val="100000"/>
-              </a:lnSpc>
+            <a:endParaRPr b="0" lang="en-GB" sz="2000" spc="-1" strike="noStrike">
+              <a:latin typeface="Arial"/>
+            </a:endParaRPr>
+          </a:p>
+          <a:p>
+            <a:pPr lvl="4" marL="2160000" indent="-216000">
               <a:spcBef>
-                <a:spcPts val="400"/>
+                <a:spcPts val="283"/>
               </a:spcBef>
               <a:buClr>
                 <a:srgbClr val="000000"/>
               </a:buClr>
-              <a:buFont typeface="Arial"/>
-              <a:buChar char="»"/>
+              <a:buSzPct val="45000"/>
+              <a:buFont typeface="Wingdings" charset="2"/>
+              <a:buChar char=""/>
             </a:pPr>
             <a:r>
-              <a:rPr b="0" lang="ru-RU" sz="2000" spc="-1" strike="noStrike">
-                <a:solidFill>
-                  <a:srgbClr val="000000"/>
-                </a:solidFill>
-                <a:latin typeface="Calibri"/>
+              <a:rPr b="0" lang="en-GB" sz="2000" spc="-1" strike="noStrike">
+                <a:latin typeface="Arial"/>
               </a:rPr>
-              <a:t>Пятый уровень</a:t>
+              <a:t>Fifth Outline Level</a:t>
             </a:r>
-            <a:endParaRPr b="0" lang="ru-RU" sz="2000" spc="-1" strike="noStrike">
-              <a:solidFill>
+            <a:endParaRPr b="0" lang="en-GB" sz="2000" spc="-1" strike="noStrike">
+              <a:latin typeface="Arial"/>
+            </a:endParaRPr>
+          </a:p>
+          <a:p>
+            <a:pPr lvl="5" marL="2592000" indent="-216000">
+              <a:spcBef>
+                <a:spcPts val="283"/>
+              </a:spcBef>
+              <a:buClr>
                 <a:srgbClr val="000000"/>
-              </a:solidFill>
-              <a:latin typeface="Calibri"/>
-            </a:endParaRPr>
-          </a:p>
-        </p:txBody>
-      </p:sp>
-      <p:sp>
-        <p:nvSpPr>
-          <p:cNvPr id="43" name="PlaceHolder 3"/>
-          <p:cNvSpPr>
-            <a:spLocks noGrp="1"/>
-          </p:cNvSpPr>
-          <p:nvPr>
-            <p:ph type="dt"/>
-          </p:nvPr>
-        </p:nvSpPr>
-        <p:spPr>
-          <a:xfrm>
-            <a:off x="457200" y="6356520"/>
-            <a:ext cx="2133360" cy="364680"/>
-          </a:xfrm>
-          <a:prstGeom prst="rect">
-            <a:avLst/>
-          </a:prstGeom>
-        </p:spPr>
-        <p:txBody>
-          <a:bodyPr anchor="ctr">
-            <a:noAutofit/>
-          </a:bodyPr>
-          <a:p>
-            <a:pPr>
-              <a:lnSpc>
-                <a:spcPct val="100000"/>
-              </a:lnSpc>
+              </a:buClr>
+              <a:buSzPct val="45000"/>
+              <a:buFont typeface="Wingdings" charset="2"/>
+              <a:buChar char=""/>
             </a:pPr>
-            <a:fld id="{5A0A223F-E106-4A0E-ADD0-DCE423B3EBEA}" type="datetime">
-              <a:rPr b="0" lang="ru-RU" sz="1200" spc="-1" strike="noStrike">
-                <a:solidFill>
-                  <a:srgbClr val="8b8b8b"/>
-                </a:solidFill>
-                <a:latin typeface="Calibri"/>
+            <a:r>
+              <a:rPr b="0" lang="en-GB" sz="2000" spc="-1" strike="noStrike">
+                <a:latin typeface="Arial"/>
               </a:rPr>
-              <a:t>8.11.21</a:t>
-            </a:fld>
-            <a:endParaRPr b="0" lang="en-GB" sz="1200" spc="-1" strike="noStrike">
-              <a:latin typeface="Times New Roman"/>
-            </a:endParaRPr>
-          </a:p>
-        </p:txBody>
-      </p:sp>
-      <p:sp>
-        <p:nvSpPr>
-          <p:cNvPr id="44" name="PlaceHolder 4"/>
-          <p:cNvSpPr>
-            <a:spLocks noGrp="1"/>
-          </p:cNvSpPr>
-          <p:nvPr>
-            <p:ph type="ftr"/>
-          </p:nvPr>
-        </p:nvSpPr>
-        <p:spPr>
-          <a:xfrm>
-            <a:off x="3124080" y="6356520"/>
-            <a:ext cx="2895120" cy="364680"/>
-          </a:xfrm>
-          <a:prstGeom prst="rect">
-            <a:avLst/>
-          </a:prstGeom>
-        </p:spPr>
-        <p:txBody>
-          <a:bodyPr anchor="ctr">
-            <a:noAutofit/>
-          </a:bodyPr>
-          <a:p>
-            <a:endParaRPr b="0" lang="en-GB" sz="2400" spc="-1" strike="noStrike">
-              <a:latin typeface="Times New Roman"/>
-            </a:endParaRPr>
-          </a:p>
-        </p:txBody>
-      </p:sp>
-      <p:sp>
-        <p:nvSpPr>
-          <p:cNvPr id="45" name="PlaceHolder 5"/>
-          <p:cNvSpPr>
-            <a:spLocks noGrp="1"/>
-          </p:cNvSpPr>
-          <p:nvPr>
-            <p:ph type="sldNum"/>
-          </p:nvPr>
-        </p:nvSpPr>
-        <p:spPr>
-          <a:xfrm>
-            <a:off x="6553080" y="6356520"/>
-            <a:ext cx="2133360" cy="364680"/>
-          </a:xfrm>
-          <a:prstGeom prst="rect">
-            <a:avLst/>
-          </a:prstGeom>
-        </p:spPr>
-        <p:txBody>
-          <a:bodyPr anchor="ctr">
-            <a:noAutofit/>
-          </a:bodyPr>
-          <a:p>
-            <a:pPr algn="r">
-              <a:lnSpc>
-                <a:spcPct val="100000"/>
-              </a:lnSpc>
+              <a:t>Sixth Outline Level</a:t>
+            </a:r>
+            <a:endParaRPr b="0" lang="en-GB" sz="2000" spc="-1" strike="noStrike">
+              <a:latin typeface="Arial"/>
+            </a:endParaRPr>
+          </a:p>
+          <a:p>
+            <a:pPr lvl="6" marL="3024000" indent="-216000">
+              <a:spcBef>
+                <a:spcPts val="283"/>
+              </a:spcBef>
+              <a:buClr>
+                <a:srgbClr val="000000"/>
+              </a:buClr>
+              <a:buSzPct val="45000"/>
+              <a:buFont typeface="Wingdings" charset="2"/>
+              <a:buChar char=""/>
             </a:pPr>
-            <a:fld id="{3D21F373-6896-4EB0-ACDD-1911573141FC}" type="slidenum">
-              <a:rPr b="0" lang="ru-RU" sz="1200" spc="-1" strike="noStrike">
-                <a:solidFill>
-                  <a:srgbClr val="8b8b8b"/>
-                </a:solidFill>
-                <a:latin typeface="Calibri"/>
+            <a:r>
+              <a:rPr b="0" lang="en-GB" sz="2000" spc="-1" strike="noStrike">
+                <a:latin typeface="Arial"/>
               </a:rPr>
-              <a:t>&lt;number&gt;</a:t>
-            </a:fld>
-            <a:endParaRPr b="0" lang="en-GB" sz="1200" spc="-1" strike="noStrike">
-              <a:latin typeface="Times New Roman"/>
+              <a:t>Seventh Outline Level</a:t>
+            </a:r>
+            <a:endParaRPr b="0" lang="en-GB" sz="2000" spc="-1" strike="noStrike">
+              <a:latin typeface="Arial"/>
             </a:endParaRPr>
           </a:p>
         </p:txBody>
@@ -3765,14 +3286,14 @@
       </p:grpSpPr>
       <p:sp>
         <p:nvSpPr>
-          <p:cNvPr id="82" name="TextShape 1"/>
-          <p:cNvSpPr txBox="1"/>
+          <p:cNvPr id="76" name="CustomShape 1"/>
+          <p:cNvSpPr/>
           <p:nvPr/>
         </p:nvSpPr>
         <p:spPr>
           <a:xfrm>
             <a:off x="685800" y="2357280"/>
-            <a:ext cx="7772040" cy="2080800"/>
+            <a:ext cx="7771680" cy="2080440"/>
           </a:xfrm>
           <a:prstGeom prst="rect">
             <a:avLst/>
@@ -3782,8 +3303,14 @@
             <a:noFill/>
           </a:ln>
         </p:spPr>
-        <p:txBody>
-          <a:bodyPr anchor="ctr">
+        <p:style>
+          <a:lnRef idx="0"/>
+          <a:fillRef idx="0"/>
+          <a:effectRef idx="0"/>
+          <a:fontRef idx="minor"/>
+        </p:style>
+        <p:txBody>
+          <a:bodyPr lIns="90000" rIns="90000" tIns="45000" bIns="45000" anchor="ctr">
             <a:noAutofit/>
           </a:bodyPr>
           <a:p>
@@ -3801,18 +3328,15 @@
               </a:rPr>
               <a:t>PortSave</a:t>
             </a:r>
-            <a:endParaRPr b="0" lang="ru-RU" sz="6000" spc="-1" strike="noStrike">
-              <a:solidFill>
-                <a:srgbClr val="000000"/>
-              </a:solidFill>
-              <a:latin typeface="Arial"/>
-            </a:endParaRPr>
-          </a:p>
-        </p:txBody>
-      </p:sp>
-      <p:sp>
-        <p:nvSpPr>
-          <p:cNvPr id="83" name="CustomShape 2"/>
+            <a:endParaRPr b="0" lang="en-GB" sz="6000" spc="-1" strike="noStrike">
+              <a:latin typeface="Arial"/>
+            </a:endParaRPr>
+          </a:p>
+        </p:txBody>
+      </p:sp>
+      <p:sp>
+        <p:nvSpPr>
+          <p:cNvPr id="77" name="CustomShape 2"/>
           <p:cNvSpPr/>
           <p:nvPr/>
         </p:nvSpPr>
@@ -3851,6 +3375,7 @@
                   <a:srgbClr val="000000"/>
                 </a:solidFill>
                 <a:latin typeface="Calibri"/>
+                <a:ea typeface="DejaVu Sans"/>
               </a:rPr>
               <a:t>Павлов Тимур</a:t>
             </a:r>
@@ -3902,14 +3427,14 @@
       </p:grpSpPr>
       <p:sp>
         <p:nvSpPr>
-          <p:cNvPr id="84" name="CustomShape 1"/>
+          <p:cNvPr id="78" name="CustomShape 1"/>
           <p:cNvSpPr/>
           <p:nvPr/>
         </p:nvSpPr>
         <p:spPr>
           <a:xfrm>
             <a:off x="1051200" y="1592640"/>
-            <a:ext cx="7603920" cy="4508280"/>
+            <a:ext cx="7603560" cy="4507920"/>
           </a:xfrm>
           <a:prstGeom prst="rect">
             <a:avLst/>
@@ -3947,12 +3472,12 @@
                   <a:srgbClr val="000000"/>
                 </a:solidFill>
                 <a:latin typeface="Calibri"/>
+                <a:ea typeface="DejaVu Sans"/>
               </a:rPr>
-              <a:t>- Это приложение написано для детей учителей.</a:t>
+              <a:t>- Это приложение создано для детей учителей.</a:t>
             </a:r>
             <a:endParaRPr b="0" lang="en-GB" sz="2400" spc="-1" strike="noStrike">
               <a:latin typeface="Arial"/>
-              <a:ea typeface="Noto Sans CJK SC"/>
             </a:endParaRPr>
           </a:p>
           <a:p>
@@ -3973,12 +3498,12 @@
                   <a:srgbClr val="000000"/>
                 </a:solidFill>
                 <a:latin typeface="Calibri"/>
+                <a:ea typeface="DejaVu Sans"/>
               </a:rPr>
               <a:t>В нем можно:</a:t>
             </a:r>
             <a:endParaRPr b="0" lang="en-GB" sz="2400" spc="-1" strike="noStrike">
               <a:latin typeface="Arial"/>
-              <a:ea typeface="Noto Sans CJK SC"/>
             </a:endParaRPr>
           </a:p>
           <a:p>
@@ -3999,12 +3524,12 @@
                   <a:srgbClr val="000000"/>
                 </a:solidFill>
                 <a:latin typeface="Calibri"/>
+                <a:ea typeface="DejaVu Sans"/>
               </a:rPr>
               <a:t>- Создавать портфолио</a:t>
             </a:r>
             <a:endParaRPr b="0" lang="en-GB" sz="2400" spc="-1" strike="noStrike">
               <a:latin typeface="Arial"/>
-              <a:ea typeface="Noto Sans CJK SC"/>
             </a:endParaRPr>
           </a:p>
           <a:p>
@@ -4025,12 +3550,12 @@
                   <a:srgbClr val="000000"/>
                 </a:solidFill>
                 <a:latin typeface="Calibri"/>
+                <a:ea typeface="DejaVu Sans"/>
               </a:rPr>
-              <a:t>- Отправлять задание</a:t>
+              <a:t>- Отправлять задания</a:t>
             </a:r>
             <a:endParaRPr b="0" lang="en-GB" sz="2400" spc="-1" strike="noStrike">
               <a:latin typeface="Arial"/>
-              <a:ea typeface="Noto Sans CJK SC"/>
             </a:endParaRPr>
           </a:p>
           <a:p>
@@ -4051,26 +3576,26 @@
                   <a:srgbClr val="000000"/>
                 </a:solidFill>
                 <a:latin typeface="Calibri"/>
+                <a:ea typeface="DejaVu Sans"/>
               </a:rPr>
               <a:t>- Создавать классы</a:t>
             </a:r>
             <a:endParaRPr b="0" lang="en-GB" sz="2400" spc="-1" strike="noStrike">
               <a:latin typeface="Arial"/>
-              <a:ea typeface="Noto Sans CJK SC"/>
-            </a:endParaRPr>
-          </a:p>
-        </p:txBody>
-      </p:sp>
-      <p:sp>
-        <p:nvSpPr>
-          <p:cNvPr id="85" name="CustomShape 2"/>
+            </a:endParaRPr>
+          </a:p>
+        </p:txBody>
+      </p:sp>
+      <p:sp>
+        <p:nvSpPr>
+          <p:cNvPr id="79" name="CustomShape 2"/>
           <p:cNvSpPr/>
           <p:nvPr/>
         </p:nvSpPr>
         <p:spPr>
           <a:xfrm>
             <a:off x="1080000" y="718200"/>
-            <a:ext cx="2098440" cy="577800"/>
+            <a:ext cx="2098080" cy="577440"/>
           </a:xfrm>
           <a:prstGeom prst="rect">
             <a:avLst/>
@@ -4102,6 +3627,7 @@
                   <a:srgbClr val="000000"/>
                 </a:solidFill>
                 <a:latin typeface="Arial"/>
+                <a:ea typeface="DejaVu Sans"/>
               </a:rPr>
               <a:t>О проекте</a:t>
             </a:r>
@@ -4143,14 +3669,14 @@
       </p:grpSpPr>
       <p:sp>
         <p:nvSpPr>
-          <p:cNvPr id="86" name="CustomShape 1"/>
+          <p:cNvPr id="80" name="CustomShape 1"/>
           <p:cNvSpPr/>
           <p:nvPr/>
         </p:nvSpPr>
         <p:spPr>
           <a:xfrm>
             <a:off x="1051200" y="1592640"/>
-            <a:ext cx="7603920" cy="4508280"/>
+            <a:ext cx="7603560" cy="4507920"/>
           </a:xfrm>
           <a:prstGeom prst="rect">
             <a:avLst/>
@@ -4190,8 +3716,24 @@
                 <a:latin typeface="Calibri"/>
                 <a:ea typeface="Noto Sans CJK SC"/>
               </a:rPr>
-              <a:t>Многие дети теряют свои грамоты, дипломы и </a:t>
+              <a:t>Часто грамоты, дипломы и сертификаты теряются. Эти документы могли бы пригодиться при поступлении в новую школу, колледж, вуз и т.п. </a:t>
             </a:r>
+            <a:endParaRPr b="0" lang="en-GB" sz="2000" spc="-1" strike="noStrike">
+              <a:latin typeface="Arial"/>
+            </a:endParaRPr>
+          </a:p>
+          <a:p>
+            <a:pPr>
+              <a:lnSpc>
+                <a:spcPct val="100000"/>
+              </a:lnSpc>
+              <a:spcBef>
+                <a:spcPts val="400"/>
+              </a:spcBef>
+              <a:tabLst>
+                <a:tab algn="l" pos="0"/>
+              </a:tabLst>
+            </a:pPr>
             <a:r>
               <a:rPr b="0" lang="ru-RU" sz="2000" spc="-1" strike="noStrike">
                 <a:solidFill>
@@ -4200,41 +3742,10 @@
                 <a:latin typeface="Calibri"/>
                 <a:ea typeface="Noto Sans CJK SC"/>
               </a:rPr>
-              <a:t>сертификаты, которые могли бы им помочь при </a:t>
-            </a:r>
-            <a:r>
-              <a:rPr b="0" lang="ru-RU" sz="2000" spc="-1" strike="noStrike">
-                <a:solidFill>
-                  <a:srgbClr val="000000"/>
-                </a:solidFill>
-                <a:latin typeface="Calibri"/>
-                <a:ea typeface="Noto Sans CJK SC"/>
-              </a:rPr>
-              <a:t>поступлении в новую школу, колледж, вуз и </a:t>
-            </a:r>
-            <a:r>
-              <a:rPr b="0" lang="ru-RU" sz="2000" spc="-1" strike="noStrike">
-                <a:solidFill>
-                  <a:srgbClr val="000000"/>
-                </a:solidFill>
-                <a:latin typeface="Calibri"/>
-                <a:ea typeface="Noto Sans CJK SC"/>
-              </a:rPr>
-              <a:t>т.п., но мое приложение даст им возможность </a:t>
-            </a:r>
-            <a:r>
-              <a:rPr b="0" lang="ru-RU" sz="2000" spc="-1" strike="noStrike">
-                <a:solidFill>
-                  <a:srgbClr val="000000"/>
-                </a:solidFill>
-                <a:latin typeface="Calibri"/>
-                <a:ea typeface="Noto Sans CJK SC"/>
-              </a:rPr>
-              <a:t>сохранить свои достижения в интернете.</a:t>
+              <a:t>Приложение PortSave даст возможность сохранить свои достижения в личном профиле и в любое время воспользоваться ими.</a:t>
             </a:r>
             <a:endParaRPr b="0" lang="en-GB" sz="2000" spc="-1" strike="noStrike">
               <a:latin typeface="Arial"/>
-              <a:ea typeface="Noto Sans CJK SC"/>
             </a:endParaRPr>
           </a:p>
           <a:p>
@@ -4251,7 +3762,6 @@
             </a:pPr>
             <a:endParaRPr b="0" lang="en-GB" sz="2000" spc="-1" strike="noStrike">
               <a:latin typeface="Arial"/>
-              <a:ea typeface="Noto Sans CJK SC"/>
             </a:endParaRPr>
           </a:p>
           <a:p>
@@ -4268,21 +3778,20 @@
             </a:pPr>
             <a:endParaRPr b="0" lang="en-GB" sz="2000" spc="-1" strike="noStrike">
               <a:latin typeface="Arial"/>
-              <a:ea typeface="Noto Sans CJK SC"/>
-            </a:endParaRPr>
-          </a:p>
-        </p:txBody>
-      </p:sp>
-      <p:sp>
-        <p:nvSpPr>
-          <p:cNvPr id="87" name="CustomShape 2"/>
+            </a:endParaRPr>
+          </a:p>
+        </p:txBody>
+      </p:sp>
+      <p:sp>
+        <p:nvSpPr>
+          <p:cNvPr id="81" name="CustomShape 2"/>
           <p:cNvSpPr/>
           <p:nvPr/>
         </p:nvSpPr>
         <p:spPr>
           <a:xfrm>
             <a:off x="757800" y="718200"/>
-            <a:ext cx="2744280" cy="577800"/>
+            <a:ext cx="2743920" cy="577440"/>
           </a:xfrm>
           <a:prstGeom prst="rect">
             <a:avLst/>
@@ -4314,6 +3823,7 @@
                   <a:srgbClr val="000000"/>
                 </a:solidFill>
                 <a:latin typeface="Arial"/>
+                <a:ea typeface="DejaVu Sans"/>
               </a:rPr>
               <a:t>Цель проекта</a:t>
             </a:r>
@@ -4355,14 +3865,14 @@
       </p:grpSpPr>
       <p:sp>
         <p:nvSpPr>
-          <p:cNvPr id="88" name="CustomShape 1"/>
+          <p:cNvPr id="82" name="CustomShape 1"/>
           <p:cNvSpPr/>
           <p:nvPr/>
         </p:nvSpPr>
         <p:spPr>
           <a:xfrm>
             <a:off x="1051200" y="1592640"/>
-            <a:ext cx="7603920" cy="4508280"/>
+            <a:ext cx="7603560" cy="4507920"/>
           </a:xfrm>
           <a:prstGeom prst="rect">
             <a:avLst/>
@@ -4381,14 +3891,14 @@
       </p:sp>
       <p:sp>
         <p:nvSpPr>
-          <p:cNvPr id="89" name="CustomShape 2"/>
+          <p:cNvPr id="83" name="CustomShape 2"/>
           <p:cNvSpPr/>
           <p:nvPr/>
         </p:nvSpPr>
         <p:spPr>
           <a:xfrm>
-            <a:off x="850680" y="718200"/>
-            <a:ext cx="2557080" cy="577800"/>
+            <a:off x="1015920" y="718200"/>
+            <a:ext cx="3880080" cy="577440"/>
           </a:xfrm>
           <a:prstGeom prst="rect">
             <a:avLst/>
@@ -4420,8 +3930,9 @@
                   <a:srgbClr val="000000"/>
                 </a:solidFill>
                 <a:latin typeface="Arial"/>
+                <a:ea typeface="DejaVu Sans"/>
               </a:rPr>
-              <a:t>Регистрация</a:t>
+              <a:t>Регистрация и вход</a:t>
             </a:r>
             <a:endParaRPr b="0" lang="en-GB" sz="3200" spc="-1" strike="noStrike">
               <a:latin typeface="Arial"/>
@@ -4431,7 +3942,7 @@
       </p:sp>
       <p:pic>
         <p:nvPicPr>
-          <p:cNvPr id="90" name="Picture 2" descr="C:\Users\admin\Desktop\app_images\Screenshot_1.png"/>
+          <p:cNvPr id="84" name="Picture 2" descr="C:\Users\admin\Desktop\app_images\Screenshot_1.png"/>
           <p:cNvPicPr/>
           <p:nvPr/>
         </p:nvPicPr>
@@ -4442,7 +3953,7 @@
         <p:spPr>
           <a:xfrm>
             <a:off x="750240" y="3104640"/>
-            <a:ext cx="4146120" cy="2799360"/>
+            <a:ext cx="4145760" cy="2799000"/>
           </a:xfrm>
           <a:prstGeom prst="rect">
             <a:avLst/>
@@ -4454,7 +3965,7 @@
       </p:pic>
       <p:pic>
         <p:nvPicPr>
-          <p:cNvPr id="91" name="Picture 3" descr="C:\Users\admin\Desktop\app_images\Screenshot_2.png"/>
+          <p:cNvPr id="85" name="Picture 3" descr="C:\Users\admin\Desktop\app_images\Screenshot_2.png"/>
           <p:cNvPicPr/>
           <p:nvPr/>
         </p:nvPicPr>
@@ -4465,7 +3976,7 @@
         <p:spPr>
           <a:xfrm>
             <a:off x="5112000" y="3096000"/>
-            <a:ext cx="3409200" cy="2808000"/>
+            <a:ext cx="3408840" cy="2807640"/>
           </a:xfrm>
           <a:prstGeom prst="rect">
             <a:avLst/>
@@ -4477,14 +3988,14 @@
       </p:pic>
       <p:sp>
         <p:nvSpPr>
-          <p:cNvPr id="92" name="TextShape 3"/>
-          <p:cNvSpPr txBox="1"/>
+          <p:cNvPr id="86" name="CustomShape 3"/>
+          <p:cNvSpPr/>
           <p:nvPr/>
         </p:nvSpPr>
         <p:spPr>
           <a:xfrm>
             <a:off x="928440" y="1440000"/>
-            <a:ext cx="7560000" cy="1048320"/>
+            <a:ext cx="7559640" cy="1047960"/>
           </a:xfrm>
           <a:prstGeom prst="rect">
             <a:avLst/>
@@ -4494,28 +4005,54 @@
             <a:noFill/>
           </a:ln>
         </p:spPr>
+        <p:style>
+          <a:lnRef idx="0"/>
+          <a:fillRef idx="0"/>
+          <a:effectRef idx="0"/>
+          <a:fontRef idx="minor"/>
+        </p:style>
         <p:txBody>
           <a:bodyPr lIns="90000" rIns="90000" tIns="45000" bIns="45000">
             <a:noAutofit/>
           </a:bodyPr>
           <a:p>
+            <a:pPr>
+              <a:lnSpc>
+                <a:spcPct val="100000"/>
+              </a:lnSpc>
+            </a:pPr>
             <a:r>
               <a:rPr b="0" lang="en-GB" sz="2000" spc="-1" strike="noStrike">
                 <a:latin typeface="Arial"/>
               </a:rPr>
-              <a:t>- При первом запуске программы вас встретит окно регистрации.</a:t>
+              <a:t>- При первом запуске программы вас встретит окно регистрации</a:t>
             </a:r>
             <a:endParaRPr b="0" lang="en-GB" sz="2000" spc="-1" strike="noStrike">
               <a:latin typeface="Arial"/>
             </a:endParaRPr>
           </a:p>
           <a:p>
+            <a:pPr>
+              <a:lnSpc>
+                <a:spcPct val="100000"/>
+              </a:lnSpc>
+            </a:pPr>
             <a:r>
               <a:rPr b="0" lang="en-GB" sz="2000" spc="-1" strike="noStrike">
                 <a:latin typeface="Arial"/>
               </a:rPr>
-              <a:t>- Но если у вас есть аккаунт, вы может в него войти</a:t>
+              <a:t>- Или окно входа в уже существующий аккаунт</a:t>
             </a:r>
+            <a:endParaRPr b="0" lang="en-GB" sz="2000" spc="-1" strike="noStrike">
+              <a:latin typeface="Arial"/>
+            </a:endParaRPr>
+          </a:p>
+          <a:p>
+            <a:pPr>
+              <a:lnSpc>
+                <a:spcPct val="100000"/>
+              </a:lnSpc>
+            </a:pPr>
             <a:endParaRPr b="0" lang="en-GB" sz="2000" spc="-1" strike="noStrike">
               <a:latin typeface="Arial"/>
             </a:endParaRPr>
@@ -4554,14 +4091,14 @@
       </p:grpSpPr>
       <p:sp>
         <p:nvSpPr>
-          <p:cNvPr id="93" name="CustomShape 1"/>
+          <p:cNvPr id="87" name="CustomShape 1"/>
           <p:cNvSpPr/>
           <p:nvPr/>
         </p:nvSpPr>
         <p:spPr>
           <a:xfrm>
             <a:off x="1051200" y="1592640"/>
-            <a:ext cx="7603920" cy="4508280"/>
+            <a:ext cx="7603560" cy="4507920"/>
           </a:xfrm>
           <a:prstGeom prst="rect">
             <a:avLst/>
@@ -4580,14 +4117,14 @@
       </p:sp>
       <p:sp>
         <p:nvSpPr>
-          <p:cNvPr id="94" name="CustomShape 2"/>
+          <p:cNvPr id="88" name="CustomShape 2"/>
           <p:cNvSpPr/>
           <p:nvPr/>
         </p:nvSpPr>
         <p:spPr>
           <a:xfrm>
             <a:off x="1015200" y="720000"/>
-            <a:ext cx="1936800" cy="577800"/>
+            <a:ext cx="1936440" cy="577440"/>
           </a:xfrm>
           <a:prstGeom prst="rect">
             <a:avLst/>
@@ -4619,6 +4156,7 @@
                   <a:srgbClr val="000000"/>
                 </a:solidFill>
                 <a:latin typeface="Arial"/>
+                <a:ea typeface="DejaVu Sans"/>
               </a:rPr>
               <a:t>Профиль</a:t>
             </a:r>
@@ -4630,14 +4168,14 @@
       </p:sp>
       <p:sp>
         <p:nvSpPr>
-          <p:cNvPr id="95" name="TextShape 3"/>
-          <p:cNvSpPr txBox="1"/>
+          <p:cNvPr id="89" name="CustomShape 3"/>
+          <p:cNvSpPr/>
           <p:nvPr/>
         </p:nvSpPr>
         <p:spPr>
           <a:xfrm>
             <a:off x="928440" y="1440000"/>
-            <a:ext cx="7560000" cy="1156320"/>
+            <a:ext cx="7559640" cy="1155960"/>
           </a:xfrm>
           <a:prstGeom prst="rect">
             <a:avLst/>
@@ -4647,11 +4185,22 @@
             <a:noFill/>
           </a:ln>
         </p:spPr>
+        <p:style>
+          <a:lnRef idx="0"/>
+          <a:fillRef idx="0"/>
+          <a:effectRef idx="0"/>
+          <a:fontRef idx="minor"/>
+        </p:style>
         <p:txBody>
           <a:bodyPr lIns="90000" rIns="90000" tIns="45000" bIns="45000">
             <a:noAutofit/>
           </a:bodyPr>
           <a:p>
+            <a:pPr>
+              <a:lnSpc>
+                <a:spcPct val="100000"/>
+              </a:lnSpc>
+            </a:pPr>
             <a:r>
               <a:rPr b="0" lang="en-GB" sz="2000" spc="-1" strike="noStrike">
                 <a:latin typeface="Arial"/>
@@ -4663,6 +4212,11 @@
             </a:endParaRPr>
           </a:p>
           <a:p>
+            <a:pPr>
+              <a:lnSpc>
+                <a:spcPct val="100000"/>
+              </a:lnSpc>
+            </a:pPr>
             <a:r>
               <a:rPr b="0" lang="en-GB" sz="2000" spc="-1" strike="noStrike">
                 <a:latin typeface="Arial"/>
@@ -4674,6 +4228,11 @@
             </a:endParaRPr>
           </a:p>
           <a:p>
+            <a:pPr>
+              <a:lnSpc>
+                <a:spcPct val="100000"/>
+              </a:lnSpc>
+            </a:pPr>
             <a:r>
               <a:rPr b="0" lang="en-GB" sz="2000" spc="-1" strike="noStrike">
                 <a:latin typeface="Arial"/>
@@ -4688,7 +4247,7 @@
       </p:sp>
       <p:pic>
         <p:nvPicPr>
-          <p:cNvPr id="96" name="Picture 2_0" descr="C:\Users\admin\Desktop\app_images\Screenshot_5.png"/>
+          <p:cNvPr id="90" name="Picture 2_0" descr="C:\Users\admin\Desktop\app_images\Screenshot_5.png"/>
           <p:cNvPicPr/>
           <p:nvPr/>
         </p:nvPicPr>
@@ -4699,7 +4258,7 @@
         <p:spPr>
           <a:xfrm>
             <a:off x="895680" y="2664000"/>
-            <a:ext cx="2848320" cy="3881520"/>
+            <a:ext cx="2847960" cy="3881160"/>
           </a:xfrm>
           <a:prstGeom prst="rect">
             <a:avLst/>
@@ -4711,7 +4270,7 @@
       </p:pic>
       <p:pic>
         <p:nvPicPr>
-          <p:cNvPr id="97" name="Picture 3_0" descr="C:\Users\admin\Desktop\app_images\Screenshot_3.png"/>
+          <p:cNvPr id="91" name="Picture 3_0" descr="C:\Users\admin\Desktop\app_images\Screenshot_3.png"/>
           <p:cNvPicPr/>
           <p:nvPr/>
         </p:nvPicPr>
@@ -4722,7 +4281,7 @@
         <p:spPr>
           <a:xfrm>
             <a:off x="5634360" y="4581360"/>
-            <a:ext cx="2538000" cy="2025720"/>
+            <a:ext cx="2537640" cy="2025360"/>
           </a:xfrm>
           <a:prstGeom prst="rect">
             <a:avLst/>
@@ -4734,7 +4293,7 @@
       </p:pic>
       <p:pic>
         <p:nvPicPr>
-          <p:cNvPr id="98" name="Picture 4" descr="C:\Users\admin\Desktop\app_images\Screenshot_4.png"/>
+          <p:cNvPr id="92" name="Picture 4" descr="C:\Users\admin\Desktop\app_images\Screenshot_4.png"/>
           <p:cNvPicPr/>
           <p:nvPr/>
         </p:nvPicPr>
@@ -4745,7 +4304,7 @@
         <p:spPr>
           <a:xfrm>
             <a:off x="5580360" y="2349360"/>
-            <a:ext cx="2564640" cy="1986120"/>
+            <a:ext cx="2564280" cy="1985760"/>
           </a:xfrm>
           <a:prstGeom prst="rect">
             <a:avLst/>
@@ -4757,14 +4316,14 @@
       </p:pic>
       <p:sp>
         <p:nvSpPr>
-          <p:cNvPr id="99" name="CustomShape 4"/>
+          <p:cNvPr id="93" name="CustomShape 4"/>
           <p:cNvSpPr/>
           <p:nvPr/>
         </p:nvSpPr>
         <p:spPr>
           <a:xfrm>
             <a:off x="1257480" y="3672000"/>
-            <a:ext cx="4374000" cy="1901880"/>
+            <a:ext cx="4373640" cy="1901520"/>
           </a:xfrm>
           <a:custGeom>
             <a:avLst/>
@@ -4806,14 +4365,14 @@
       </p:sp>
       <p:sp>
         <p:nvSpPr>
-          <p:cNvPr id="100" name="CustomShape 5"/>
+          <p:cNvPr id="94" name="CustomShape 5"/>
           <p:cNvSpPr/>
           <p:nvPr/>
         </p:nvSpPr>
         <p:spPr>
           <a:xfrm flipV="1">
-            <a:off x="1494000" y="3239640"/>
-            <a:ext cx="4086360" cy="241200"/>
+            <a:off x="1494000" y="3238560"/>
+            <a:ext cx="4086000" cy="240840"/>
           </a:xfrm>
           <a:custGeom>
             <a:avLst/>
@@ -4885,14 +4444,14 @@
       </p:grpSpPr>
       <p:sp>
         <p:nvSpPr>
-          <p:cNvPr id="101" name="CustomShape 1"/>
+          <p:cNvPr id="95" name="CustomShape 1"/>
           <p:cNvSpPr/>
           <p:nvPr/>
         </p:nvSpPr>
         <p:spPr>
           <a:xfrm>
             <a:off x="1051200" y="1592640"/>
-            <a:ext cx="7603920" cy="4508280"/>
+            <a:ext cx="7603560" cy="4507920"/>
           </a:xfrm>
           <a:prstGeom prst="rect">
             <a:avLst/>
@@ -4911,14 +4470,14 @@
       </p:sp>
       <p:sp>
         <p:nvSpPr>
-          <p:cNvPr id="102" name="CustomShape 2"/>
+          <p:cNvPr id="96" name="CustomShape 2"/>
           <p:cNvSpPr/>
           <p:nvPr/>
         </p:nvSpPr>
         <p:spPr>
           <a:xfrm>
-            <a:off x="982800" y="720000"/>
-            <a:ext cx="3697200" cy="577800"/>
+            <a:off x="936000" y="720000"/>
+            <a:ext cx="3697200" cy="577440"/>
           </a:xfrm>
           <a:prstGeom prst="rect">
             <a:avLst/>
@@ -4950,6 +4509,7 @@
                   <a:srgbClr val="000000"/>
                 </a:solidFill>
                 <a:latin typeface="Arial"/>
+                <a:ea typeface="DejaVu Sans"/>
               </a:rPr>
               <a:t>Окно списка задач</a:t>
             </a:r>
@@ -4961,14 +4521,14 @@
       </p:sp>
       <p:sp>
         <p:nvSpPr>
-          <p:cNvPr id="103" name="TextShape 3"/>
-          <p:cNvSpPr txBox="1"/>
+          <p:cNvPr id="97" name="CustomShape 3"/>
+          <p:cNvSpPr/>
           <p:nvPr/>
         </p:nvSpPr>
         <p:spPr>
           <a:xfrm>
             <a:off x="928440" y="1440000"/>
-            <a:ext cx="7560000" cy="657000"/>
+            <a:ext cx="7559640" cy="656640"/>
           </a:xfrm>
           <a:prstGeom prst="rect">
             <a:avLst/>
@@ -4978,16 +4538,27 @@
             <a:noFill/>
           </a:ln>
         </p:spPr>
+        <p:style>
+          <a:lnRef idx="0"/>
+          <a:fillRef idx="0"/>
+          <a:effectRef idx="0"/>
+          <a:fontRef idx="minor"/>
+        </p:style>
         <p:txBody>
           <a:bodyPr lIns="90000" rIns="90000" tIns="45000" bIns="45000">
             <a:noAutofit/>
           </a:bodyPr>
           <a:p>
+            <a:pPr>
+              <a:lnSpc>
+                <a:spcPct val="100000"/>
+              </a:lnSpc>
+            </a:pPr>
             <a:r>
               <a:rPr b="0" lang="en-GB" sz="2000" spc="-1" strike="noStrike">
                 <a:latin typeface="Arial"/>
               </a:rPr>
-              <a:t>В этом окне показывается список задач которые вам отправил ваш учитель</a:t>
+              <a:t>В этом окне показывается список задачи, отправленные учителем ученику / классу</a:t>
             </a:r>
             <a:endParaRPr b="0" lang="en-GB" sz="2000" spc="-1" strike="noStrike">
               <a:latin typeface="Arial"/>
@@ -4997,7 +4568,7 @@
       </p:sp>
       <p:pic>
         <p:nvPicPr>
-          <p:cNvPr id="104" name="Picture 2_1" descr="C:\Users\admin\Desktop\app_images\Screenshot_6.png"/>
+          <p:cNvPr id="98" name="Picture 2_1" descr="C:\Users\admin\Desktop\app_images\Screenshot_6.png"/>
           <p:cNvPicPr/>
           <p:nvPr/>
         </p:nvPicPr>
@@ -5008,7 +4579,7 @@
         <p:spPr>
           <a:xfrm>
             <a:off x="3060360" y="2349360"/>
-            <a:ext cx="2843640" cy="3885480"/>
+            <a:ext cx="2843280" cy="3885120"/>
           </a:xfrm>
           <a:prstGeom prst="rect">
             <a:avLst/>
@@ -5020,7 +4591,7 @@
       </p:pic>
       <p:pic>
         <p:nvPicPr>
-          <p:cNvPr id="105" name="Picture 2_2" descr="C:\Users\admin\Desktop\app_images\Screenshot_6.png"/>
+          <p:cNvPr id="99" name="Picture 2_2" descr="C:\Users\admin\Desktop\app_images\Screenshot_6.png"/>
           <p:cNvPicPr/>
           <p:nvPr/>
         </p:nvPicPr>
@@ -5031,7 +4602,7 @@
         <p:spPr>
           <a:xfrm>
             <a:off x="3060360" y="2349360"/>
-            <a:ext cx="2843640" cy="3885480"/>
+            <a:ext cx="2843280" cy="3885120"/>
           </a:xfrm>
           <a:prstGeom prst="rect">
             <a:avLst/>
@@ -5073,14 +4644,14 @@
       </p:grpSpPr>
       <p:sp>
         <p:nvSpPr>
-          <p:cNvPr id="106" name="CustomShape 1"/>
+          <p:cNvPr id="100" name="CustomShape 1"/>
           <p:cNvSpPr/>
           <p:nvPr/>
         </p:nvSpPr>
         <p:spPr>
           <a:xfrm>
             <a:off x="1051200" y="1592640"/>
-            <a:ext cx="7603920" cy="4508280"/>
+            <a:ext cx="7603560" cy="4507920"/>
           </a:xfrm>
           <a:prstGeom prst="rect">
             <a:avLst/>
@@ -5099,14 +4670,14 @@
       </p:sp>
       <p:sp>
         <p:nvSpPr>
-          <p:cNvPr id="107" name="CustomShape 2"/>
+          <p:cNvPr id="101" name="CustomShape 2"/>
           <p:cNvSpPr/>
           <p:nvPr/>
         </p:nvSpPr>
         <p:spPr>
           <a:xfrm>
             <a:off x="925920" y="720000"/>
-            <a:ext cx="7558920" cy="577800"/>
+            <a:ext cx="7558920" cy="577440"/>
           </a:xfrm>
           <a:prstGeom prst="rect">
             <a:avLst/>
@@ -5138,53 +4709,9 @@
                   <a:srgbClr val="000000"/>
                 </a:solidFill>
                 <a:latin typeface="Arial"/>
+                <a:ea typeface="DejaVu Sans"/>
               </a:rPr>
-              <a:t>У </a:t>
-            </a:r>
-            <a:r>
-              <a:rPr b="0" lang="ru-RU" sz="3200" spc="-1" strike="noStrike">
-                <a:solidFill>
-                  <a:srgbClr val="000000"/>
-                </a:solidFill>
-                <a:latin typeface="Arial"/>
-              </a:rPr>
-              <a:t>учителя </a:t>
-            </a:r>
-            <a:r>
-              <a:rPr b="0" lang="ru-RU" sz="3200" spc="-1" strike="noStrike">
-                <a:solidFill>
-                  <a:srgbClr val="000000"/>
-                </a:solidFill>
-                <a:latin typeface="Arial"/>
-              </a:rPr>
-              <a:t>приложе</a:t>
-            </a:r>
-            <a:r>
-              <a:rPr b="0" lang="ru-RU" sz="3200" spc="-1" strike="noStrike">
-                <a:solidFill>
-                  <a:srgbClr val="000000"/>
-                </a:solidFill>
-                <a:latin typeface="Arial"/>
-              </a:rPr>
-              <a:t>ние </a:t>
-            </a:r>
-            <a:r>
-              <a:rPr b="0" lang="ru-RU" sz="3200" spc="-1" strike="noStrike">
-                <a:solidFill>
-                  <a:srgbClr val="000000"/>
-                </a:solidFill>
-                <a:latin typeface="Arial"/>
-              </a:rPr>
-              <a:t>выгляди</a:t>
-            </a:r>
-            <a:r>
-              <a:rPr b="0" lang="ru-RU" sz="3200" spc="-1" strike="noStrike">
-                <a:solidFill>
-                  <a:srgbClr val="000000"/>
-                </a:solidFill>
-                <a:latin typeface="Arial"/>
-              </a:rPr>
-              <a:t>т иначе</a:t>
+              <a:t>У учителя приложение выглядит иначе</a:t>
             </a:r>
             <a:endParaRPr b="0" lang="en-GB" sz="3200" spc="-1" strike="noStrike">
               <a:latin typeface="Arial"/>
@@ -5194,7 +4721,7 @@
       </p:sp>
       <p:pic>
         <p:nvPicPr>
-          <p:cNvPr id="108" name="Picture 2_3" descr="C:\Users\admin\Desktop\app_images\Screenshot_7.png"/>
+          <p:cNvPr id="102" name="Picture 2_3" descr="C:\Users\admin\Desktop\app_images\Screenshot_7.png"/>
           <p:cNvPicPr/>
           <p:nvPr/>
         </p:nvPicPr>
@@ -5205,7 +4732,7 @@
         <p:spPr>
           <a:xfrm>
             <a:off x="3798360" y="1610640"/>
-            <a:ext cx="2465640" cy="3501360"/>
+            <a:ext cx="2465280" cy="3501000"/>
           </a:xfrm>
           <a:prstGeom prst="rect">
             <a:avLst/>
@@ -5217,7 +4744,7 @@
       </p:pic>
       <p:pic>
         <p:nvPicPr>
-          <p:cNvPr id="109" name="Picture 3_1" descr="C:\Users\admin\Desktop\app_images\Screenshot_8.png"/>
+          <p:cNvPr id="103" name="Picture 3_1" descr="C:\Users\admin\Desktop\app_images\Screenshot_8.png"/>
           <p:cNvPicPr/>
           <p:nvPr/>
         </p:nvPicPr>
@@ -5228,7 +4755,7 @@
         <p:spPr>
           <a:xfrm>
             <a:off x="1008000" y="1584000"/>
-            <a:ext cx="2628000" cy="3581280"/>
+            <a:ext cx="2627640" cy="3580920"/>
           </a:xfrm>
           <a:prstGeom prst="rect">
             <a:avLst/>
@@ -5270,14 +4797,14 @@
       </p:grpSpPr>
       <p:sp>
         <p:nvSpPr>
-          <p:cNvPr id="110" name="TextShape 1"/>
-          <p:cNvSpPr txBox="1"/>
+          <p:cNvPr id="104" name="CustomShape 1"/>
+          <p:cNvSpPr/>
           <p:nvPr/>
         </p:nvSpPr>
         <p:spPr>
           <a:xfrm>
             <a:off x="457200" y="368640"/>
-            <a:ext cx="8229240" cy="4860360"/>
+            <a:ext cx="8228880" cy="4860000"/>
           </a:xfrm>
           <a:prstGeom prst="rect">
             <a:avLst/>
@@ -5287,12 +4814,18 @@
             <a:noFill/>
           </a:ln>
         </p:spPr>
-        <p:txBody>
-          <a:bodyPr>
+        <p:style>
+          <a:lnRef idx="0"/>
+          <a:fillRef idx="0"/>
+          <a:effectRef idx="0"/>
+          <a:fontRef idx="minor"/>
+        </p:style>
+        <p:txBody>
+          <a:bodyPr lIns="90000" rIns="90000" tIns="45000" bIns="45000">
             <a:noAutofit/>
           </a:bodyPr>
           <a:p>
-            <a:pPr marL="343080" indent="-342720" algn="ctr">
+            <a:pPr marL="343080" indent="-342360" algn="ctr">
               <a:lnSpc>
                 <a:spcPct val="100000"/>
               </a:lnSpc>
@@ -5312,15 +4845,12 @@
               </a:rPr>
               <a:t>Спасибо!</a:t>
             </a:r>
-            <a:endParaRPr b="0" lang="ru-RU" sz="4800" spc="-1" strike="noStrike">
-              <a:solidFill>
-                <a:srgbClr val="000000"/>
-              </a:solidFill>
-              <a:latin typeface="Calibri"/>
-            </a:endParaRPr>
-          </a:p>
-          <a:p>
-            <a:pPr marL="343080" indent="-342720" algn="ctr">
+            <a:endParaRPr b="0" lang="en-GB" sz="4800" spc="-1" strike="noStrike">
+              <a:latin typeface="Arial"/>
+            </a:endParaRPr>
+          </a:p>
+          <a:p>
+            <a:pPr marL="343080" indent="-342360" algn="ctr">
               <a:lnSpc>
                 <a:spcPct val="100000"/>
               </a:lnSpc>
@@ -5331,15 +4861,12 @@
                 <a:tab algn="l" pos="0"/>
               </a:tabLst>
             </a:pPr>
-            <a:endParaRPr b="0" lang="ru-RU" sz="4800" spc="-1" strike="noStrike">
-              <a:solidFill>
-                <a:srgbClr val="000000"/>
-              </a:solidFill>
-              <a:latin typeface="Calibri"/>
-            </a:endParaRPr>
-          </a:p>
-          <a:p>
-            <a:pPr marL="343080" indent="-342720">
+            <a:endParaRPr b="0" lang="en-GB" sz="4800" spc="-1" strike="noStrike">
+              <a:latin typeface="Arial"/>
+            </a:endParaRPr>
+          </a:p>
+          <a:p>
+            <a:pPr marL="343080" indent="-342360">
               <a:lnSpc>
                 <a:spcPct val="100000"/>
               </a:lnSpc>
@@ -5350,15 +4877,12 @@
                 <a:tab algn="l" pos="0"/>
               </a:tabLst>
             </a:pPr>
-            <a:endParaRPr b="0" lang="ru-RU" sz="4800" spc="-1" strike="noStrike">
-              <a:solidFill>
-                <a:srgbClr val="000000"/>
-              </a:solidFill>
-              <a:latin typeface="Calibri"/>
-            </a:endParaRPr>
-          </a:p>
-          <a:p>
-            <a:pPr marL="343080" indent="-342720">
+            <a:endParaRPr b="0" lang="en-GB" sz="4800" spc="-1" strike="noStrike">
+              <a:latin typeface="Arial"/>
+            </a:endParaRPr>
+          </a:p>
+          <a:p>
+            <a:pPr marL="343080" indent="-342360">
               <a:lnSpc>
                 <a:spcPct val="100000"/>
               </a:lnSpc>
@@ -5369,25 +4893,22 @@
                 <a:tab algn="l" pos="0"/>
               </a:tabLst>
             </a:pPr>
-            <a:endParaRPr b="0" lang="ru-RU" sz="4800" spc="-1" strike="noStrike">
-              <a:solidFill>
-                <a:srgbClr val="000000"/>
-              </a:solidFill>
-              <a:latin typeface="Calibri"/>
-            </a:endParaRPr>
-          </a:p>
-        </p:txBody>
-      </p:sp>
-      <p:sp>
-        <p:nvSpPr>
-          <p:cNvPr id="111" name="CustomShape 2"/>
+            <a:endParaRPr b="0" lang="en-GB" sz="4800" spc="-1" strike="noStrike">
+              <a:latin typeface="Arial"/>
+            </a:endParaRPr>
+          </a:p>
+        </p:txBody>
+      </p:sp>
+      <p:sp>
+        <p:nvSpPr>
+          <p:cNvPr id="105" name="CustomShape 2"/>
           <p:cNvSpPr/>
           <p:nvPr/>
         </p:nvSpPr>
         <p:spPr>
           <a:xfrm>
             <a:off x="6192000" y="5688000"/>
-            <a:ext cx="2791800" cy="760320"/>
+            <a:ext cx="2791440" cy="942840"/>
           </a:xfrm>
           <a:prstGeom prst="rect">
             <a:avLst/>
@@ -5419,6 +4940,7 @@
                   <a:srgbClr val="000000"/>
                 </a:solidFill>
                 <a:latin typeface="Calibri"/>
+                <a:ea typeface="DejaVu Sans"/>
               </a:rPr>
               <a:t>Павлов Тимур</a:t>
             </a:r>

</xml_diff>